<commit_message>
Presentation updates till Univariate Analysis
</commit_message>
<xml_diff>
--- a/Lending Club Case Study.pptx
+++ b/Lending Club Case Study.pptx
@@ -5,10 +5,10 @@
     <p:sldMasterId id="2147483821" r:id="rId1"/>
   </p:sldMasterIdLst>
   <p:notesMasterIdLst>
-    <p:notesMasterId r:id="rId9"/>
+    <p:notesMasterId r:id="rId23"/>
   </p:notesMasterIdLst>
   <p:handoutMasterIdLst>
-    <p:handoutMasterId r:id="rId10"/>
+    <p:handoutMasterId r:id="rId24"/>
   </p:handoutMasterIdLst>
   <p:sldIdLst>
     <p:sldId id="270" r:id="rId2"/>
@@ -18,6 +18,20 @@
     <p:sldId id="279" r:id="rId6"/>
     <p:sldId id="280" r:id="rId7"/>
     <p:sldId id="281" r:id="rId8"/>
+    <p:sldId id="282" r:id="rId9"/>
+    <p:sldId id="283" r:id="rId10"/>
+    <p:sldId id="284" r:id="rId11"/>
+    <p:sldId id="285" r:id="rId12"/>
+    <p:sldId id="287" r:id="rId13"/>
+    <p:sldId id="288" r:id="rId14"/>
+    <p:sldId id="289" r:id="rId15"/>
+    <p:sldId id="290" r:id="rId16"/>
+    <p:sldId id="291" r:id="rId17"/>
+    <p:sldId id="293" r:id="rId18"/>
+    <p:sldId id="294" r:id="rId19"/>
+    <p:sldId id="295" r:id="rId20"/>
+    <p:sldId id="296" r:id="rId21"/>
+    <p:sldId id="286" r:id="rId22"/>
   </p:sldIdLst>
   <p:sldSz cx="12192000" cy="6858000"/>
   <p:notesSz cx="6858000" cy="9144000"/>
@@ -987,10 +1001,10 @@
         <a:lstStyle/>
         <a:p>
           <a:r>
-            <a:rPr lang="en-IN"/>
-            <a:t>Discarding unwanted Data</a:t>
+            <a:rPr lang="en-IN" dirty="0"/>
+            <a:t>Dealing with Nulls &amp; NA</a:t>
           </a:r>
-          <a:endParaRPr lang="en-US"/>
+          <a:endParaRPr lang="en-US" dirty="0"/>
         </a:p>
       </dgm:t>
     </dgm:pt>
@@ -1024,10 +1038,10 @@
         <a:lstStyle/>
         <a:p>
           <a:r>
-            <a:rPr lang="en-IN"/>
-            <a:t>Filling in Missing Values in the Data</a:t>
+            <a:rPr lang="en-IN" dirty="0"/>
+            <a:t>Filling in Missing Information</a:t>
           </a:r>
-          <a:endParaRPr lang="en-US"/>
+          <a:endParaRPr lang="en-US" dirty="0"/>
         </a:p>
       </dgm:t>
     </dgm:pt>
@@ -1430,7 +1444,7 @@
         <a:p>
           <a:r>
             <a:rPr lang="en-IN" b="1" dirty="0"/>
-            <a:t>Filtering Outliers Data</a:t>
+            <a:t>Outliers Data Treatment</a:t>
           </a:r>
           <a:endParaRPr lang="en-US" b="1" dirty="0"/>
         </a:p>
@@ -2079,10 +2093,10 @@
             <a:buNone/>
           </a:pPr>
           <a:r>
-            <a:rPr lang="en-IN" sz="1500" kern="1200"/>
-            <a:t>Discarding unwanted Data</a:t>
+            <a:rPr lang="en-IN" sz="1500" kern="1200" dirty="0"/>
+            <a:t>Dealing with Nulls &amp; NA</a:t>
           </a:r>
-          <a:endParaRPr lang="en-US" sz="1500" kern="1200"/>
+          <a:endParaRPr lang="en-US" sz="1500" kern="1200" dirty="0"/>
         </a:p>
       </dsp:txBody>
       <dsp:txXfrm>
@@ -2188,10 +2202,10 @@
             <a:buNone/>
           </a:pPr>
           <a:r>
-            <a:rPr lang="en-IN" sz="1500" kern="1200"/>
-            <a:t>Filling in Missing Values in the Data</a:t>
+            <a:rPr lang="en-IN" sz="1500" kern="1200" dirty="0"/>
+            <a:t>Filling in Missing Information</a:t>
           </a:r>
-          <a:endParaRPr lang="en-US" sz="1500" kern="1200"/>
+          <a:endParaRPr lang="en-US" sz="1500" kern="1200" dirty="0"/>
         </a:p>
       </dsp:txBody>
       <dsp:txXfrm>
@@ -2785,7 +2799,7 @@
           </a:pPr>
           <a:r>
             <a:rPr lang="en-IN" sz="1800" b="1" kern="1200" dirty="0"/>
-            <a:t>Filtering Outliers Data</a:t>
+            <a:t>Outliers Data Treatment</a:t>
           </a:r>
           <a:endParaRPr lang="en-US" sz="1800" b="1" kern="1200" dirty="0"/>
         </a:p>
@@ -8938,22 +8952,22 @@
   <p:extLst>
     <p:ext uri="{27BBF7A9-308A-43DC-89C8-2F10F3537804}">
       <p15:sldGuideLst xmlns:p15="http://schemas.microsoft.com/office/powerpoint/2012/main">
-        <p15:guide id="1" orient="horz" pos="2160" userDrawn="1">
+        <p15:guide id="1" orient="horz" pos="2160">
           <p15:clr>
             <a:srgbClr val="F26B43"/>
           </p15:clr>
         </p15:guide>
-        <p15:guide id="2" pos="3840" userDrawn="1">
+        <p15:guide id="2" pos="3840">
           <p15:clr>
             <a:srgbClr val="F26B43"/>
           </p15:clr>
         </p15:guide>
-        <p15:guide id="3" pos="864" userDrawn="1">
+        <p15:guide id="3" pos="864">
           <p15:clr>
             <a:srgbClr val="F26B43"/>
           </p15:clr>
         </p15:guide>
-        <p15:guide id="4" pos="6792" userDrawn="1">
+        <p15:guide id="4" pos="6792">
           <p15:clr>
             <a:srgbClr val="F26B43"/>
           </p15:clr>
@@ -9280,6 +9294,2267 @@
 </p:sld>
 </file>
 
+<file path=ppt/slides/slide10.xml><?xml version="1.0" encoding="utf-8"?>
+<p:sld xmlns:a="http://schemas.openxmlformats.org/drawingml/2006/main" xmlns:r="http://schemas.openxmlformats.org/officeDocument/2006/relationships" xmlns:p="http://schemas.openxmlformats.org/presentationml/2006/main">
+  <p:cSld>
+    <p:bg>
+      <p:bgPr>
+        <a:solidFill>
+          <a:schemeClr val="bg1"/>
+        </a:solidFill>
+        <a:effectLst/>
+      </p:bgPr>
+    </p:bg>
+    <p:spTree>
+      <p:nvGrpSpPr>
+        <p:cNvPr id="1" name=""/>
+        <p:cNvGrpSpPr/>
+        <p:nvPr/>
+      </p:nvGrpSpPr>
+      <p:grpSpPr>
+        <a:xfrm>
+          <a:off x="0" y="0"/>
+          <a:ext cx="0" cy="0"/>
+          <a:chOff x="0" y="0"/>
+          <a:chExt cx="0" cy="0"/>
+        </a:xfrm>
+      </p:grpSpPr>
+      <p:sp>
+        <p:nvSpPr>
+          <p:cNvPr id="2" name="Title 1">
+            <a:extLst>
+              <a:ext uri="{FF2B5EF4-FFF2-40B4-BE49-F238E27FC236}">
+                <a16:creationId xmlns:a16="http://schemas.microsoft.com/office/drawing/2014/main" id="{B25C81AC-6E52-C28A-4A6A-8BBA20A2DC93}"/>
+              </a:ext>
+            </a:extLst>
+          </p:cNvPr>
+          <p:cNvSpPr>
+            <a:spLocks noGrp="1"/>
+          </p:cNvSpPr>
+          <p:nvPr>
+            <p:ph type="title"/>
+          </p:nvPr>
+        </p:nvSpPr>
+        <p:spPr>
+          <a:xfrm>
+            <a:off x="657224" y="499533"/>
+            <a:ext cx="10772775" cy="1658198"/>
+          </a:xfrm>
+        </p:spPr>
+        <p:txBody>
+          <a:bodyPr>
+            <a:normAutofit/>
+          </a:bodyPr>
+          <a:lstStyle/>
+          <a:p>
+            <a:r>
+              <a:rPr lang="en-IN" dirty="0"/>
+              <a:t>Outliers Data Treatment</a:t>
+            </a:r>
+          </a:p>
+        </p:txBody>
+      </p:sp>
+      <p:sp>
+        <p:nvSpPr>
+          <p:cNvPr id="3078" name="Content Placeholder 3077">
+            <a:extLst>
+              <a:ext uri="{FF2B5EF4-FFF2-40B4-BE49-F238E27FC236}">
+                <a16:creationId xmlns:a16="http://schemas.microsoft.com/office/drawing/2014/main" id="{D955F024-EE53-0A61-BAE3-10D5338B5B96}"/>
+              </a:ext>
+            </a:extLst>
+          </p:cNvPr>
+          <p:cNvSpPr>
+            <a:spLocks noGrp="1"/>
+          </p:cNvSpPr>
+          <p:nvPr>
+            <p:ph idx="1"/>
+          </p:nvPr>
+        </p:nvSpPr>
+        <p:spPr>
+          <a:xfrm>
+            <a:off x="676656" y="2011680"/>
+            <a:ext cx="10667619" cy="3766185"/>
+          </a:xfrm>
+        </p:spPr>
+        <p:txBody>
+          <a:bodyPr>
+            <a:normAutofit/>
+          </a:bodyPr>
+          <a:lstStyle/>
+          <a:p>
+            <a:r>
+              <a:rPr lang="en-US" dirty="0">
+                <a:solidFill>
+                  <a:schemeClr val="tx1">
+                    <a:lumMod val="95000"/>
+                  </a:schemeClr>
+                </a:solidFill>
+              </a:rPr>
+              <a:t>The column </a:t>
+            </a:r>
+            <a:r>
+              <a:rPr lang="en-US" b="1" i="1" dirty="0" err="1">
+                <a:solidFill>
+                  <a:schemeClr val="tx1">
+                    <a:lumMod val="95000"/>
+                  </a:schemeClr>
+                </a:solidFill>
+              </a:rPr>
+              <a:t>annual_income</a:t>
+            </a:r>
+            <a:r>
+              <a:rPr lang="en-US" dirty="0">
+                <a:solidFill>
+                  <a:schemeClr val="tx1">
+                    <a:lumMod val="95000"/>
+                  </a:schemeClr>
+                </a:solidFill>
+              </a:rPr>
+              <a:t> has very high range of values. </a:t>
+            </a:r>
+          </a:p>
+          <a:p>
+            <a:r>
+              <a:rPr lang="en-US" dirty="0">
+                <a:solidFill>
+                  <a:schemeClr val="tx1">
+                    <a:lumMod val="95000"/>
+                  </a:schemeClr>
+                </a:solidFill>
+              </a:rPr>
+              <a:t>These values can cause shift the analysis data. </a:t>
+            </a:r>
+          </a:p>
+          <a:p>
+            <a:r>
+              <a:rPr lang="en-US" dirty="0">
+                <a:solidFill>
+                  <a:schemeClr val="tx1">
+                    <a:lumMod val="95000"/>
+                  </a:schemeClr>
+                </a:solidFill>
+              </a:rPr>
+              <a:t>After ignoring the </a:t>
+            </a:r>
+            <a:r>
+              <a:rPr lang="en-US" b="1" i="1" dirty="0" err="1">
+                <a:solidFill>
+                  <a:schemeClr val="tx1">
+                    <a:lumMod val="95000"/>
+                  </a:schemeClr>
+                </a:solidFill>
+              </a:rPr>
+              <a:t>annual_income</a:t>
+            </a:r>
+            <a:r>
+              <a:rPr lang="en-US" dirty="0">
+                <a:solidFill>
+                  <a:schemeClr val="tx1">
+                    <a:lumMod val="95000"/>
+                  </a:schemeClr>
+                </a:solidFill>
+              </a:rPr>
+              <a:t> values &gt;150000, we see the data is good  for analysis.</a:t>
+            </a:r>
+          </a:p>
+        </p:txBody>
+      </p:sp>
+      <p:pic>
+        <p:nvPicPr>
+          <p:cNvPr id="3074" name="Picture 2">
+            <a:extLst>
+              <a:ext uri="{FF2B5EF4-FFF2-40B4-BE49-F238E27FC236}">
+                <a16:creationId xmlns:a16="http://schemas.microsoft.com/office/drawing/2014/main" id="{7D7B7E5D-7519-B9CF-4B51-29C2028CA05A}"/>
+              </a:ext>
+            </a:extLst>
+          </p:cNvPr>
+          <p:cNvPicPr>
+            <a:picLocks noChangeAspect="1" noChangeArrowheads="1"/>
+          </p:cNvPicPr>
+          <p:nvPr/>
+        </p:nvPicPr>
+        <p:blipFill>
+          <a:blip r:embed="rId2">
+            <a:extLst>
+              <a:ext uri="{28A0092B-C50C-407E-A947-70E740481C1C}">
+                <a14:useLocalDpi xmlns:a14="http://schemas.microsoft.com/office/drawing/2010/main" val="0"/>
+              </a:ext>
+            </a:extLst>
+          </a:blip>
+          <a:stretch>
+            <a:fillRect/>
+          </a:stretch>
+        </p:blipFill>
+        <p:spPr bwMode="auto">
+          <a:xfrm>
+            <a:off x="847725" y="3804515"/>
+            <a:ext cx="3562350" cy="2662855"/>
+          </a:xfrm>
+          <a:prstGeom prst="rect">
+            <a:avLst/>
+          </a:prstGeom>
+          <a:noFill/>
+          <a:extLst>
+            <a:ext uri="{909E8E84-426E-40DD-AFC4-6F175D3DCCD1}">
+              <a14:hiddenFill xmlns:a14="http://schemas.microsoft.com/office/drawing/2010/main">
+                <a:solidFill>
+                  <a:srgbClr val="FFFFFF"/>
+                </a:solidFill>
+              </a14:hiddenFill>
+            </a:ext>
+          </a:extLst>
+        </p:spPr>
+      </p:pic>
+      <p:pic>
+        <p:nvPicPr>
+          <p:cNvPr id="3076" name="Picture 4">
+            <a:extLst>
+              <a:ext uri="{FF2B5EF4-FFF2-40B4-BE49-F238E27FC236}">
+                <a16:creationId xmlns:a16="http://schemas.microsoft.com/office/drawing/2014/main" id="{E19D48A4-328B-C3A5-3B48-5C01BEF08E84}"/>
+              </a:ext>
+            </a:extLst>
+          </p:cNvPr>
+          <p:cNvPicPr>
+            <a:picLocks noChangeAspect="1" noChangeArrowheads="1"/>
+          </p:cNvPicPr>
+          <p:nvPr/>
+        </p:nvPicPr>
+        <p:blipFill>
+          <a:blip r:embed="rId3">
+            <a:extLst>
+              <a:ext uri="{28A0092B-C50C-407E-A947-70E740481C1C}">
+                <a14:useLocalDpi xmlns:a14="http://schemas.microsoft.com/office/drawing/2010/main" val="0"/>
+              </a:ext>
+            </a:extLst>
+          </a:blip>
+          <a:srcRect/>
+          <a:stretch>
+            <a:fillRect/>
+          </a:stretch>
+        </p:blipFill>
+        <p:spPr bwMode="auto">
+          <a:xfrm>
+            <a:off x="7010400" y="3804515"/>
+            <a:ext cx="3810000" cy="2637693"/>
+          </a:xfrm>
+          <a:prstGeom prst="rect">
+            <a:avLst/>
+          </a:prstGeom>
+          <a:noFill/>
+          <a:extLst>
+            <a:ext uri="{909E8E84-426E-40DD-AFC4-6F175D3DCCD1}">
+              <a14:hiddenFill xmlns:a14="http://schemas.microsoft.com/office/drawing/2010/main">
+                <a:solidFill>
+                  <a:srgbClr val="FFFFFF"/>
+                </a:solidFill>
+              </a14:hiddenFill>
+            </a:ext>
+          </a:extLst>
+        </p:spPr>
+      </p:pic>
+      <p:sp>
+        <p:nvSpPr>
+          <p:cNvPr id="4" name="Arrow: Right 3">
+            <a:extLst>
+              <a:ext uri="{FF2B5EF4-FFF2-40B4-BE49-F238E27FC236}">
+                <a16:creationId xmlns:a16="http://schemas.microsoft.com/office/drawing/2014/main" id="{1D66B7AD-AD97-09D0-DCEF-1C32D30E1B5F}"/>
+              </a:ext>
+            </a:extLst>
+          </p:cNvPr>
+          <p:cNvSpPr/>
+          <p:nvPr/>
+        </p:nvSpPr>
+        <p:spPr>
+          <a:xfrm>
+            <a:off x="5014722" y="4794748"/>
+            <a:ext cx="1323975" cy="657225"/>
+          </a:xfrm>
+          <a:prstGeom prst="rightArrow">
+            <a:avLst/>
+          </a:prstGeom>
+        </p:spPr>
+        <p:style>
+          <a:lnRef idx="2">
+            <a:schemeClr val="accent1">
+              <a:shade val="50000"/>
+            </a:schemeClr>
+          </a:lnRef>
+          <a:fillRef idx="1">
+            <a:schemeClr val="accent1"/>
+          </a:fillRef>
+          <a:effectRef idx="0">
+            <a:schemeClr val="accent1"/>
+          </a:effectRef>
+          <a:fontRef idx="minor">
+            <a:schemeClr val="lt1"/>
+          </a:fontRef>
+        </p:style>
+        <p:txBody>
+          <a:bodyPr rtlCol="0" anchor="ctr"/>
+          <a:lstStyle/>
+          <a:p>
+            <a:pPr algn="ctr"/>
+            <a:endParaRPr lang="en-IN"/>
+          </a:p>
+        </p:txBody>
+      </p:sp>
+    </p:spTree>
+    <p:extLst>
+      <p:ext uri="{BB962C8B-B14F-4D97-AF65-F5344CB8AC3E}">
+        <p14:creationId xmlns:p14="http://schemas.microsoft.com/office/powerpoint/2010/main" val="2048651872"/>
+      </p:ext>
+    </p:extLst>
+  </p:cSld>
+  <p:clrMapOvr>
+    <a:masterClrMapping/>
+  </p:clrMapOvr>
+  <mc:AlternateContent xmlns:mc="http://schemas.openxmlformats.org/markup-compatibility/2006" xmlns:p14="http://schemas.microsoft.com/office/powerpoint/2010/main">
+    <mc:Choice Requires="p14">
+      <p:transition spd="med" p14:dur="700">
+        <p:fade/>
+      </p:transition>
+    </mc:Choice>
+    <mc:Fallback xmlns="">
+      <p:transition spd="med">
+        <p:fade/>
+      </p:transition>
+    </mc:Fallback>
+  </mc:AlternateContent>
+</p:sld>
+</file>
+
+<file path=ppt/slides/slide11.xml><?xml version="1.0" encoding="utf-8"?>
+<p:sld xmlns:a="http://schemas.openxmlformats.org/drawingml/2006/main" xmlns:r="http://schemas.openxmlformats.org/officeDocument/2006/relationships" xmlns:p="http://schemas.openxmlformats.org/presentationml/2006/main">
+  <p:cSld>
+    <p:spTree>
+      <p:nvGrpSpPr>
+        <p:cNvPr id="1" name=""/>
+        <p:cNvGrpSpPr/>
+        <p:nvPr/>
+      </p:nvGrpSpPr>
+      <p:grpSpPr>
+        <a:xfrm>
+          <a:off x="0" y="0"/>
+          <a:ext cx="0" cy="0"/>
+          <a:chOff x="0" y="0"/>
+          <a:chExt cx="0" cy="0"/>
+        </a:xfrm>
+      </p:grpSpPr>
+      <p:sp>
+        <p:nvSpPr>
+          <p:cNvPr id="2" name="Title 1">
+            <a:extLst>
+              <a:ext uri="{FF2B5EF4-FFF2-40B4-BE49-F238E27FC236}">
+                <a16:creationId xmlns:a16="http://schemas.microsoft.com/office/drawing/2014/main" id="{00AFF480-C09C-EE59-8C9A-1991868B03F9}"/>
+              </a:ext>
+            </a:extLst>
+          </p:cNvPr>
+          <p:cNvSpPr>
+            <a:spLocks noGrp="1"/>
+          </p:cNvSpPr>
+          <p:nvPr>
+            <p:ph type="title"/>
+          </p:nvPr>
+        </p:nvSpPr>
+        <p:spPr>
+          <a:xfrm>
+            <a:off x="657224" y="499533"/>
+            <a:ext cx="10772775" cy="814917"/>
+          </a:xfrm>
+        </p:spPr>
+        <p:txBody>
+          <a:bodyPr>
+            <a:normAutofit/>
+          </a:bodyPr>
+          <a:lstStyle/>
+          <a:p>
+            <a:r>
+              <a:rPr lang="en-IN" dirty="0"/>
+              <a:t>Data Analysis </a:t>
+            </a:r>
+            <a:r>
+              <a:rPr lang="en-IN" sz="3200" dirty="0"/>
+              <a:t>–</a:t>
+            </a:r>
+            <a:r>
+              <a:rPr lang="en-IN" sz="4400" dirty="0"/>
+              <a:t> </a:t>
+            </a:r>
+            <a:r>
+              <a:rPr lang="en-IN" sz="3200" dirty="0"/>
+              <a:t>Loan Amounts funded by Investor</a:t>
+            </a:r>
+            <a:endParaRPr lang="en-IN" dirty="0"/>
+          </a:p>
+        </p:txBody>
+      </p:sp>
+      <p:sp>
+        <p:nvSpPr>
+          <p:cNvPr id="3" name="Content Placeholder 2">
+            <a:extLst>
+              <a:ext uri="{FF2B5EF4-FFF2-40B4-BE49-F238E27FC236}">
+                <a16:creationId xmlns:a16="http://schemas.microsoft.com/office/drawing/2014/main" id="{9AED37CA-F64D-4CE1-3D64-48A81505B507}"/>
+              </a:ext>
+            </a:extLst>
+          </p:cNvPr>
+          <p:cNvSpPr>
+            <a:spLocks noGrp="1"/>
+          </p:cNvSpPr>
+          <p:nvPr>
+            <p:ph idx="1"/>
+          </p:nvPr>
+        </p:nvSpPr>
+        <p:spPr>
+          <a:xfrm>
+            <a:off x="657224" y="5777864"/>
+            <a:ext cx="10753725" cy="814917"/>
+          </a:xfrm>
+        </p:spPr>
+        <p:txBody>
+          <a:bodyPr/>
+          <a:lstStyle/>
+          <a:p>
+            <a:r>
+              <a:rPr lang="en-IN" dirty="0"/>
+              <a:t>Most of the loans funded are with an investor fund between &lt;10000. And loans funded between 3000-6000 have higher chances of Charged Off</a:t>
+            </a:r>
+          </a:p>
+        </p:txBody>
+      </p:sp>
+      <p:pic>
+        <p:nvPicPr>
+          <p:cNvPr id="5124" name="Picture 4">
+            <a:extLst>
+              <a:ext uri="{FF2B5EF4-FFF2-40B4-BE49-F238E27FC236}">
+                <a16:creationId xmlns:a16="http://schemas.microsoft.com/office/drawing/2014/main" id="{E78E578D-A002-CC40-B8B8-F38140F49491}"/>
+              </a:ext>
+            </a:extLst>
+          </p:cNvPr>
+          <p:cNvPicPr>
+            <a:picLocks noChangeAspect="1" noChangeArrowheads="1"/>
+          </p:cNvPicPr>
+          <p:nvPr/>
+        </p:nvPicPr>
+        <p:blipFill>
+          <a:blip r:embed="rId2">
+            <a:extLst>
+              <a:ext uri="{28A0092B-C50C-407E-A947-70E740481C1C}">
+                <a14:useLocalDpi xmlns:a14="http://schemas.microsoft.com/office/drawing/2010/main" val="0"/>
+              </a:ext>
+            </a:extLst>
+          </a:blip>
+          <a:srcRect/>
+          <a:stretch>
+            <a:fillRect/>
+          </a:stretch>
+        </p:blipFill>
+        <p:spPr bwMode="auto">
+          <a:xfrm>
+            <a:off x="910342" y="1601194"/>
+            <a:ext cx="4585584" cy="3749584"/>
+          </a:xfrm>
+          <a:prstGeom prst="rect">
+            <a:avLst/>
+          </a:prstGeom>
+          <a:noFill/>
+          <a:extLst>
+            <a:ext uri="{909E8E84-426E-40DD-AFC4-6F175D3DCCD1}">
+              <a14:hiddenFill xmlns:a14="http://schemas.microsoft.com/office/drawing/2010/main">
+                <a:solidFill>
+                  <a:srgbClr val="FFFFFF"/>
+                </a:solidFill>
+              </a14:hiddenFill>
+            </a:ext>
+          </a:extLst>
+        </p:spPr>
+      </p:pic>
+      <p:pic>
+        <p:nvPicPr>
+          <p:cNvPr id="5126" name="Picture 6">
+            <a:extLst>
+              <a:ext uri="{FF2B5EF4-FFF2-40B4-BE49-F238E27FC236}">
+                <a16:creationId xmlns:a16="http://schemas.microsoft.com/office/drawing/2014/main" id="{C3B4A0F9-84FF-822F-6808-7EC3D4D3B697}"/>
+              </a:ext>
+            </a:extLst>
+          </p:cNvPr>
+          <p:cNvPicPr>
+            <a:picLocks noChangeAspect="1" noChangeArrowheads="1"/>
+          </p:cNvPicPr>
+          <p:nvPr/>
+        </p:nvPicPr>
+        <p:blipFill>
+          <a:blip r:embed="rId3">
+            <a:extLst>
+              <a:ext uri="{28A0092B-C50C-407E-A947-70E740481C1C}">
+                <a14:useLocalDpi xmlns:a14="http://schemas.microsoft.com/office/drawing/2010/main" val="0"/>
+              </a:ext>
+            </a:extLst>
+          </a:blip>
+          <a:srcRect/>
+          <a:stretch>
+            <a:fillRect/>
+          </a:stretch>
+        </p:blipFill>
+        <p:spPr bwMode="auto">
+          <a:xfrm>
+            <a:off x="6238875" y="1574891"/>
+            <a:ext cx="4909434" cy="3775887"/>
+          </a:xfrm>
+          <a:prstGeom prst="rect">
+            <a:avLst/>
+          </a:prstGeom>
+          <a:noFill/>
+          <a:extLst>
+            <a:ext uri="{909E8E84-426E-40DD-AFC4-6F175D3DCCD1}">
+              <a14:hiddenFill xmlns:a14="http://schemas.microsoft.com/office/drawing/2010/main">
+                <a:solidFill>
+                  <a:srgbClr val="FFFFFF"/>
+                </a:solidFill>
+              </a14:hiddenFill>
+            </a:ext>
+          </a:extLst>
+        </p:spPr>
+      </p:pic>
+    </p:spTree>
+    <p:extLst>
+      <p:ext uri="{BB962C8B-B14F-4D97-AF65-F5344CB8AC3E}">
+        <p14:creationId xmlns:p14="http://schemas.microsoft.com/office/powerpoint/2010/main" val="3166379082"/>
+      </p:ext>
+    </p:extLst>
+  </p:cSld>
+  <p:clrMapOvr>
+    <a:masterClrMapping/>
+  </p:clrMapOvr>
+  <mc:AlternateContent xmlns:mc="http://schemas.openxmlformats.org/markup-compatibility/2006" xmlns:p14="http://schemas.microsoft.com/office/powerpoint/2010/main">
+    <mc:Choice Requires="p14">
+      <p:transition spd="med" p14:dur="700">
+        <p:fade/>
+      </p:transition>
+    </mc:Choice>
+    <mc:Fallback xmlns="">
+      <p:transition spd="med">
+        <p:fade/>
+      </p:transition>
+    </mc:Fallback>
+  </mc:AlternateContent>
+</p:sld>
+</file>
+
+<file path=ppt/slides/slide12.xml><?xml version="1.0" encoding="utf-8"?>
+<p:sld xmlns:a="http://schemas.openxmlformats.org/drawingml/2006/main" xmlns:r="http://schemas.openxmlformats.org/officeDocument/2006/relationships" xmlns:p="http://schemas.openxmlformats.org/presentationml/2006/main">
+  <p:cSld>
+    <p:spTree>
+      <p:nvGrpSpPr>
+        <p:cNvPr id="1" name=""/>
+        <p:cNvGrpSpPr/>
+        <p:nvPr/>
+      </p:nvGrpSpPr>
+      <p:grpSpPr>
+        <a:xfrm>
+          <a:off x="0" y="0"/>
+          <a:ext cx="0" cy="0"/>
+          <a:chOff x="0" y="0"/>
+          <a:chExt cx="0" cy="0"/>
+        </a:xfrm>
+      </p:grpSpPr>
+      <p:sp>
+        <p:nvSpPr>
+          <p:cNvPr id="2" name="Title 1">
+            <a:extLst>
+              <a:ext uri="{FF2B5EF4-FFF2-40B4-BE49-F238E27FC236}">
+                <a16:creationId xmlns:a16="http://schemas.microsoft.com/office/drawing/2014/main" id="{00AFF480-C09C-EE59-8C9A-1991868B03F9}"/>
+              </a:ext>
+            </a:extLst>
+          </p:cNvPr>
+          <p:cNvSpPr>
+            <a:spLocks noGrp="1"/>
+          </p:cNvSpPr>
+          <p:nvPr>
+            <p:ph type="title"/>
+          </p:nvPr>
+        </p:nvSpPr>
+        <p:spPr>
+          <a:xfrm>
+            <a:off x="657224" y="499533"/>
+            <a:ext cx="10772775" cy="814917"/>
+          </a:xfrm>
+        </p:spPr>
+        <p:txBody>
+          <a:bodyPr/>
+          <a:lstStyle/>
+          <a:p>
+            <a:r>
+              <a:rPr lang="en-IN" dirty="0"/>
+              <a:t>Data Analysis</a:t>
+            </a:r>
+            <a:r>
+              <a:rPr lang="en-IN" sz="3600" dirty="0"/>
+              <a:t> – Purpose</a:t>
+            </a:r>
+          </a:p>
+        </p:txBody>
+      </p:sp>
+      <p:sp>
+        <p:nvSpPr>
+          <p:cNvPr id="3" name="Content Placeholder 2">
+            <a:extLst>
+              <a:ext uri="{FF2B5EF4-FFF2-40B4-BE49-F238E27FC236}">
+                <a16:creationId xmlns:a16="http://schemas.microsoft.com/office/drawing/2014/main" id="{9AED37CA-F64D-4CE1-3D64-48A81505B507}"/>
+              </a:ext>
+            </a:extLst>
+          </p:cNvPr>
+          <p:cNvSpPr>
+            <a:spLocks noGrp="1"/>
+          </p:cNvSpPr>
+          <p:nvPr>
+            <p:ph idx="1"/>
+          </p:nvPr>
+        </p:nvSpPr>
+        <p:spPr>
+          <a:xfrm>
+            <a:off x="657224" y="5545238"/>
+            <a:ext cx="10753725" cy="814917"/>
+          </a:xfrm>
+        </p:spPr>
+        <p:txBody>
+          <a:bodyPr>
+            <a:normAutofit/>
+          </a:bodyPr>
+          <a:lstStyle/>
+          <a:p>
+            <a:r>
+              <a:rPr lang="en-IN" sz="2000" dirty="0">
+                <a:solidFill>
+                  <a:schemeClr val="tx1">
+                    <a:lumMod val="95000"/>
+                  </a:schemeClr>
+                </a:solidFill>
+              </a:rPr>
+              <a:t>Most Loans are issued against the Purpose of </a:t>
+            </a:r>
+            <a:r>
+              <a:rPr lang="en-IN" sz="2000" b="1" dirty="0">
+                <a:solidFill>
+                  <a:schemeClr val="tx1">
+                    <a:lumMod val="95000"/>
+                  </a:schemeClr>
+                </a:solidFill>
+              </a:rPr>
+              <a:t>Debt Consolidation.</a:t>
+            </a:r>
+          </a:p>
+          <a:p>
+            <a:r>
+              <a:rPr lang="en-IN" sz="2000" b="1" dirty="0">
+                <a:solidFill>
+                  <a:schemeClr val="tx1">
+                    <a:lumMod val="95000"/>
+                  </a:schemeClr>
+                </a:solidFill>
+              </a:rPr>
+              <a:t>However, more % of loans are Charged Off </a:t>
+            </a:r>
+            <a:r>
+              <a:rPr lang="en-IN" sz="2000" dirty="0">
+                <a:solidFill>
+                  <a:schemeClr val="tx1">
+                    <a:lumMod val="95000"/>
+                  </a:schemeClr>
+                </a:solidFill>
+              </a:rPr>
+              <a:t>against the Purpose ‘</a:t>
+            </a:r>
+            <a:r>
+              <a:rPr lang="en-IN" sz="2000" b="1" dirty="0">
+                <a:solidFill>
+                  <a:schemeClr val="tx1">
+                    <a:lumMod val="95000"/>
+                  </a:schemeClr>
+                </a:solidFill>
+              </a:rPr>
+              <a:t>Small Business</a:t>
+            </a:r>
+            <a:r>
+              <a:rPr lang="en-IN" sz="2000" dirty="0">
+                <a:solidFill>
+                  <a:schemeClr val="tx1">
+                    <a:lumMod val="95000"/>
+                  </a:schemeClr>
+                </a:solidFill>
+              </a:rPr>
+              <a:t>’.</a:t>
+            </a:r>
+          </a:p>
+        </p:txBody>
+      </p:sp>
+      <p:grpSp>
+        <p:nvGrpSpPr>
+          <p:cNvPr id="4" name="Group 3">
+            <a:extLst>
+              <a:ext uri="{FF2B5EF4-FFF2-40B4-BE49-F238E27FC236}">
+                <a16:creationId xmlns:a16="http://schemas.microsoft.com/office/drawing/2014/main" id="{1FE10A1E-B0C7-AD3C-E544-A2C76AAFBDCB}"/>
+              </a:ext>
+            </a:extLst>
+          </p:cNvPr>
+          <p:cNvGrpSpPr/>
+          <p:nvPr/>
+        </p:nvGrpSpPr>
+        <p:grpSpPr>
+          <a:xfrm>
+            <a:off x="876300" y="1485441"/>
+            <a:ext cx="8877066" cy="3940625"/>
+            <a:chOff x="719137" y="1218741"/>
+            <a:chExt cx="9720029" cy="4314825"/>
+          </a:xfrm>
+        </p:grpSpPr>
+        <p:pic>
+          <p:nvPicPr>
+            <p:cNvPr id="6148" name="Picture 4">
+              <a:extLst>
+                <a:ext uri="{FF2B5EF4-FFF2-40B4-BE49-F238E27FC236}">
+                  <a16:creationId xmlns:a16="http://schemas.microsoft.com/office/drawing/2014/main" id="{70FF2D7D-725C-8430-65C8-FF36CABBE906}"/>
+                </a:ext>
+              </a:extLst>
+            </p:cNvPr>
+            <p:cNvPicPr>
+              <a:picLocks noChangeAspect="1" noChangeArrowheads="1"/>
+            </p:cNvPicPr>
+            <p:nvPr/>
+          </p:nvPicPr>
+          <p:blipFill>
+            <a:blip r:embed="rId2">
+              <a:extLst>
+                <a:ext uri="{28A0092B-C50C-407E-A947-70E740481C1C}">
+                  <a14:useLocalDpi xmlns:a14="http://schemas.microsoft.com/office/drawing/2010/main" val="0"/>
+                </a:ext>
+              </a:extLst>
+            </a:blip>
+            <a:srcRect/>
+            <a:stretch>
+              <a:fillRect/>
+            </a:stretch>
+          </p:blipFill>
+          <p:spPr bwMode="auto">
+            <a:xfrm>
+              <a:off x="719137" y="3455534"/>
+              <a:ext cx="3104916" cy="2056325"/>
+            </a:xfrm>
+            <a:prstGeom prst="rect">
+              <a:avLst/>
+            </a:prstGeom>
+            <a:noFill/>
+            <a:extLst>
+              <a:ext uri="{909E8E84-426E-40DD-AFC4-6F175D3DCCD1}">
+                <a14:hiddenFill xmlns:a14="http://schemas.microsoft.com/office/drawing/2010/main">
+                  <a:solidFill>
+                    <a:srgbClr val="FFFFFF"/>
+                  </a:solidFill>
+                </a14:hiddenFill>
+              </a:ext>
+            </a:extLst>
+          </p:spPr>
+        </p:pic>
+        <p:pic>
+          <p:nvPicPr>
+            <p:cNvPr id="6150" name="Picture 6">
+              <a:extLst>
+                <a:ext uri="{FF2B5EF4-FFF2-40B4-BE49-F238E27FC236}">
+                  <a16:creationId xmlns:a16="http://schemas.microsoft.com/office/drawing/2014/main" id="{18779798-AEE8-7C1A-D0FC-FB02C79F0FCF}"/>
+                </a:ext>
+              </a:extLst>
+            </p:cNvPr>
+            <p:cNvPicPr>
+              <a:picLocks noChangeAspect="1" noChangeArrowheads="1"/>
+            </p:cNvPicPr>
+            <p:nvPr/>
+          </p:nvPicPr>
+          <p:blipFill>
+            <a:blip r:embed="rId3">
+              <a:extLst>
+                <a:ext uri="{28A0092B-C50C-407E-A947-70E740481C1C}">
+                  <a14:useLocalDpi xmlns:a14="http://schemas.microsoft.com/office/drawing/2010/main" val="0"/>
+                </a:ext>
+              </a:extLst>
+            </a:blip>
+            <a:srcRect/>
+            <a:stretch>
+              <a:fillRect/>
+            </a:stretch>
+          </p:blipFill>
+          <p:spPr bwMode="auto">
+            <a:xfrm>
+              <a:off x="719137" y="1256841"/>
+              <a:ext cx="3104916" cy="2047347"/>
+            </a:xfrm>
+            <a:prstGeom prst="rect">
+              <a:avLst/>
+            </a:prstGeom>
+            <a:noFill/>
+            <a:extLst>
+              <a:ext uri="{909E8E84-426E-40DD-AFC4-6F175D3DCCD1}">
+                <a14:hiddenFill xmlns:a14="http://schemas.microsoft.com/office/drawing/2010/main">
+                  <a:solidFill>
+                    <a:srgbClr val="FFFFFF"/>
+                  </a:solidFill>
+                </a14:hiddenFill>
+              </a:ext>
+            </a:extLst>
+          </p:spPr>
+        </p:pic>
+        <p:pic>
+          <p:nvPicPr>
+            <p:cNvPr id="6152" name="Picture 8">
+              <a:extLst>
+                <a:ext uri="{FF2B5EF4-FFF2-40B4-BE49-F238E27FC236}">
+                  <a16:creationId xmlns:a16="http://schemas.microsoft.com/office/drawing/2014/main" id="{E0A3B497-5ED7-C044-12AA-EA77DC7763CA}"/>
+                </a:ext>
+              </a:extLst>
+            </p:cNvPr>
+            <p:cNvPicPr>
+              <a:picLocks noChangeAspect="1" noChangeArrowheads="1"/>
+            </p:cNvPicPr>
+            <p:nvPr/>
+          </p:nvPicPr>
+          <p:blipFill>
+            <a:blip r:embed="rId4">
+              <a:extLst>
+                <a:ext uri="{28A0092B-C50C-407E-A947-70E740481C1C}">
+                  <a14:useLocalDpi xmlns:a14="http://schemas.microsoft.com/office/drawing/2010/main" val="0"/>
+                </a:ext>
+              </a:extLst>
+            </a:blip>
+            <a:srcRect/>
+            <a:stretch>
+              <a:fillRect/>
+            </a:stretch>
+          </p:blipFill>
+          <p:spPr bwMode="auto">
+            <a:xfrm>
+              <a:off x="3924066" y="1218741"/>
+              <a:ext cx="6515100" cy="4314825"/>
+            </a:xfrm>
+            <a:prstGeom prst="rect">
+              <a:avLst/>
+            </a:prstGeom>
+            <a:noFill/>
+            <a:extLst>
+              <a:ext uri="{909E8E84-426E-40DD-AFC4-6F175D3DCCD1}">
+                <a14:hiddenFill xmlns:a14="http://schemas.microsoft.com/office/drawing/2010/main">
+                  <a:solidFill>
+                    <a:srgbClr val="FFFFFF"/>
+                  </a:solidFill>
+                </a14:hiddenFill>
+              </a:ext>
+            </a:extLst>
+          </p:spPr>
+        </p:pic>
+      </p:grpSp>
+    </p:spTree>
+    <p:extLst>
+      <p:ext uri="{BB962C8B-B14F-4D97-AF65-F5344CB8AC3E}">
+        <p14:creationId xmlns:p14="http://schemas.microsoft.com/office/powerpoint/2010/main" val="1858488734"/>
+      </p:ext>
+    </p:extLst>
+  </p:cSld>
+  <p:clrMapOvr>
+    <a:masterClrMapping/>
+  </p:clrMapOvr>
+  <mc:AlternateContent xmlns:mc="http://schemas.openxmlformats.org/markup-compatibility/2006">
+    <mc:Choice xmlns:p14="http://schemas.microsoft.com/office/powerpoint/2010/main" Requires="p14">
+      <p:transition spd="med" p14:dur="700">
+        <p:fade/>
+      </p:transition>
+    </mc:Choice>
+    <mc:Fallback>
+      <p:transition spd="med">
+        <p:fade/>
+      </p:transition>
+    </mc:Fallback>
+  </mc:AlternateContent>
+</p:sld>
+</file>
+
+<file path=ppt/slides/slide13.xml><?xml version="1.0" encoding="utf-8"?>
+<p:sld xmlns:a="http://schemas.openxmlformats.org/drawingml/2006/main" xmlns:r="http://schemas.openxmlformats.org/officeDocument/2006/relationships" xmlns:p="http://schemas.openxmlformats.org/presentationml/2006/main">
+  <p:cSld>
+    <p:spTree>
+      <p:nvGrpSpPr>
+        <p:cNvPr id="1" name=""/>
+        <p:cNvGrpSpPr/>
+        <p:nvPr/>
+      </p:nvGrpSpPr>
+      <p:grpSpPr>
+        <a:xfrm>
+          <a:off x="0" y="0"/>
+          <a:ext cx="0" cy="0"/>
+          <a:chOff x="0" y="0"/>
+          <a:chExt cx="0" cy="0"/>
+        </a:xfrm>
+      </p:grpSpPr>
+      <p:sp>
+        <p:nvSpPr>
+          <p:cNvPr id="2" name="Title 1">
+            <a:extLst>
+              <a:ext uri="{FF2B5EF4-FFF2-40B4-BE49-F238E27FC236}">
+                <a16:creationId xmlns:a16="http://schemas.microsoft.com/office/drawing/2014/main" id="{00AFF480-C09C-EE59-8C9A-1991868B03F9}"/>
+              </a:ext>
+            </a:extLst>
+          </p:cNvPr>
+          <p:cNvSpPr>
+            <a:spLocks noGrp="1"/>
+          </p:cNvSpPr>
+          <p:nvPr>
+            <p:ph type="title"/>
+          </p:nvPr>
+        </p:nvSpPr>
+        <p:spPr>
+          <a:xfrm>
+            <a:off x="657224" y="499533"/>
+            <a:ext cx="10772775" cy="814917"/>
+          </a:xfrm>
+        </p:spPr>
+        <p:txBody>
+          <a:bodyPr/>
+          <a:lstStyle/>
+          <a:p>
+            <a:r>
+              <a:rPr lang="en-IN" dirty="0"/>
+              <a:t>Data Analysis</a:t>
+            </a:r>
+            <a:r>
+              <a:rPr lang="en-IN" sz="3600" dirty="0"/>
+              <a:t> – Employee Tenure</a:t>
+            </a:r>
+            <a:endParaRPr lang="en-IN" dirty="0"/>
+          </a:p>
+        </p:txBody>
+      </p:sp>
+      <p:sp>
+        <p:nvSpPr>
+          <p:cNvPr id="3" name="Content Placeholder 2">
+            <a:extLst>
+              <a:ext uri="{FF2B5EF4-FFF2-40B4-BE49-F238E27FC236}">
+                <a16:creationId xmlns:a16="http://schemas.microsoft.com/office/drawing/2014/main" id="{9AED37CA-F64D-4CE1-3D64-48A81505B507}"/>
+              </a:ext>
+            </a:extLst>
+          </p:cNvPr>
+          <p:cNvSpPr>
+            <a:spLocks noGrp="1"/>
+          </p:cNvSpPr>
+          <p:nvPr>
+            <p:ph idx="1"/>
+          </p:nvPr>
+        </p:nvSpPr>
+        <p:spPr>
+          <a:xfrm>
+            <a:off x="6200777" y="1528762"/>
+            <a:ext cx="5314949" cy="3954357"/>
+          </a:xfrm>
+        </p:spPr>
+        <p:txBody>
+          <a:bodyPr>
+            <a:normAutofit/>
+          </a:bodyPr>
+          <a:lstStyle/>
+          <a:p>
+            <a:pPr>
+              <a:lnSpc>
+                <a:spcPct val="114000"/>
+              </a:lnSpc>
+            </a:pPr>
+            <a:r>
+              <a:rPr lang="en-IN" dirty="0">
+                <a:solidFill>
+                  <a:schemeClr val="tx1">
+                    <a:lumMod val="95000"/>
+                  </a:schemeClr>
+                </a:solidFill>
+              </a:rPr>
+              <a:t>Loans taken by people with employment tenure </a:t>
+            </a:r>
+            <a:r>
+              <a:rPr lang="en-IN" b="1" dirty="0">
+                <a:solidFill>
+                  <a:schemeClr val="tx1">
+                    <a:lumMod val="95000"/>
+                  </a:schemeClr>
+                </a:solidFill>
+              </a:rPr>
+              <a:t>10 or more years </a:t>
+            </a:r>
+            <a:r>
+              <a:rPr lang="en-IN" dirty="0">
+                <a:solidFill>
+                  <a:schemeClr val="tx1">
+                    <a:lumMod val="95000"/>
+                  </a:schemeClr>
+                </a:solidFill>
+              </a:rPr>
+              <a:t>are more likely to be Charged Off.</a:t>
+            </a:r>
+          </a:p>
+        </p:txBody>
+      </p:sp>
+      <p:pic>
+        <p:nvPicPr>
+          <p:cNvPr id="7170" name="Picture 2">
+            <a:extLst>
+              <a:ext uri="{FF2B5EF4-FFF2-40B4-BE49-F238E27FC236}">
+                <a16:creationId xmlns:a16="http://schemas.microsoft.com/office/drawing/2014/main" id="{11F00697-688E-F1AA-9423-AC1872B2F186}"/>
+              </a:ext>
+            </a:extLst>
+          </p:cNvPr>
+          <p:cNvPicPr>
+            <a:picLocks noChangeAspect="1" noChangeArrowheads="1"/>
+          </p:cNvPicPr>
+          <p:nvPr/>
+        </p:nvPicPr>
+        <p:blipFill>
+          <a:blip r:embed="rId2">
+            <a:extLst>
+              <a:ext uri="{28A0092B-C50C-407E-A947-70E740481C1C}">
+                <a14:useLocalDpi xmlns:a14="http://schemas.microsoft.com/office/drawing/2010/main" val="0"/>
+              </a:ext>
+            </a:extLst>
+          </a:blip>
+          <a:srcRect/>
+          <a:stretch>
+            <a:fillRect/>
+          </a:stretch>
+        </p:blipFill>
+        <p:spPr bwMode="auto">
+          <a:xfrm>
+            <a:off x="781051" y="1528762"/>
+            <a:ext cx="5210174" cy="4140717"/>
+          </a:xfrm>
+          <a:prstGeom prst="rect">
+            <a:avLst/>
+          </a:prstGeom>
+          <a:noFill/>
+          <a:extLst>
+            <a:ext uri="{909E8E84-426E-40DD-AFC4-6F175D3DCCD1}">
+              <a14:hiddenFill xmlns:a14="http://schemas.microsoft.com/office/drawing/2010/main">
+                <a:solidFill>
+                  <a:srgbClr val="FFFFFF"/>
+                </a:solidFill>
+              </a14:hiddenFill>
+            </a:ext>
+          </a:extLst>
+        </p:spPr>
+      </p:pic>
+    </p:spTree>
+    <p:extLst>
+      <p:ext uri="{BB962C8B-B14F-4D97-AF65-F5344CB8AC3E}">
+        <p14:creationId xmlns:p14="http://schemas.microsoft.com/office/powerpoint/2010/main" val="3927290707"/>
+      </p:ext>
+    </p:extLst>
+  </p:cSld>
+  <p:clrMapOvr>
+    <a:masterClrMapping/>
+  </p:clrMapOvr>
+  <mc:AlternateContent xmlns:mc="http://schemas.openxmlformats.org/markup-compatibility/2006">
+    <mc:Choice xmlns:p14="http://schemas.microsoft.com/office/powerpoint/2010/main" Requires="p14">
+      <p:transition spd="med" p14:dur="700">
+        <p:fade/>
+      </p:transition>
+    </mc:Choice>
+    <mc:Fallback>
+      <p:transition spd="med">
+        <p:fade/>
+      </p:transition>
+    </mc:Fallback>
+  </mc:AlternateContent>
+</p:sld>
+</file>
+
+<file path=ppt/slides/slide14.xml><?xml version="1.0" encoding="utf-8"?>
+<p:sld xmlns:a="http://schemas.openxmlformats.org/drawingml/2006/main" xmlns:r="http://schemas.openxmlformats.org/officeDocument/2006/relationships" xmlns:p="http://schemas.openxmlformats.org/presentationml/2006/main">
+  <p:cSld>
+    <p:spTree>
+      <p:nvGrpSpPr>
+        <p:cNvPr id="1" name=""/>
+        <p:cNvGrpSpPr/>
+        <p:nvPr/>
+      </p:nvGrpSpPr>
+      <p:grpSpPr>
+        <a:xfrm>
+          <a:off x="0" y="0"/>
+          <a:ext cx="0" cy="0"/>
+          <a:chOff x="0" y="0"/>
+          <a:chExt cx="0" cy="0"/>
+        </a:xfrm>
+      </p:grpSpPr>
+      <p:sp>
+        <p:nvSpPr>
+          <p:cNvPr id="2" name="Title 1">
+            <a:extLst>
+              <a:ext uri="{FF2B5EF4-FFF2-40B4-BE49-F238E27FC236}">
+                <a16:creationId xmlns:a16="http://schemas.microsoft.com/office/drawing/2014/main" id="{00AFF480-C09C-EE59-8C9A-1991868B03F9}"/>
+              </a:ext>
+            </a:extLst>
+          </p:cNvPr>
+          <p:cNvSpPr>
+            <a:spLocks noGrp="1"/>
+          </p:cNvSpPr>
+          <p:nvPr>
+            <p:ph type="title"/>
+          </p:nvPr>
+        </p:nvSpPr>
+        <p:spPr>
+          <a:xfrm>
+            <a:off x="657224" y="499533"/>
+            <a:ext cx="10772775" cy="814917"/>
+          </a:xfrm>
+        </p:spPr>
+        <p:txBody>
+          <a:bodyPr/>
+          <a:lstStyle/>
+          <a:p>
+            <a:r>
+              <a:rPr lang="en-IN" dirty="0"/>
+              <a:t>Data Analysis</a:t>
+            </a:r>
+            <a:r>
+              <a:rPr lang="en-IN" sz="3600" dirty="0"/>
+              <a:t> – Verification Status</a:t>
+            </a:r>
+            <a:endParaRPr lang="en-IN" dirty="0"/>
+          </a:p>
+        </p:txBody>
+      </p:sp>
+      <p:sp>
+        <p:nvSpPr>
+          <p:cNvPr id="3" name="Content Placeholder 2">
+            <a:extLst>
+              <a:ext uri="{FF2B5EF4-FFF2-40B4-BE49-F238E27FC236}">
+                <a16:creationId xmlns:a16="http://schemas.microsoft.com/office/drawing/2014/main" id="{9AED37CA-F64D-4CE1-3D64-48A81505B507}"/>
+              </a:ext>
+            </a:extLst>
+          </p:cNvPr>
+          <p:cNvSpPr>
+            <a:spLocks noGrp="1"/>
+          </p:cNvSpPr>
+          <p:nvPr>
+            <p:ph idx="1"/>
+          </p:nvPr>
+        </p:nvSpPr>
+        <p:spPr>
+          <a:xfrm>
+            <a:off x="781052" y="1547812"/>
+            <a:ext cx="4867274" cy="3954357"/>
+          </a:xfrm>
+        </p:spPr>
+        <p:txBody>
+          <a:bodyPr>
+            <a:normAutofit/>
+          </a:bodyPr>
+          <a:lstStyle/>
+          <a:p>
+            <a:pPr>
+              <a:lnSpc>
+                <a:spcPct val="114000"/>
+              </a:lnSpc>
+            </a:pPr>
+            <a:r>
+              <a:rPr lang="en-IN" dirty="0">
+                <a:solidFill>
+                  <a:schemeClr val="tx1">
+                    <a:lumMod val="95000"/>
+                  </a:schemeClr>
+                </a:solidFill>
+              </a:rPr>
+              <a:t>Almost 44% of the loans are Not Verified.</a:t>
+            </a:r>
+          </a:p>
+          <a:p>
+            <a:pPr lvl="1">
+              <a:lnSpc>
+                <a:spcPct val="114000"/>
+              </a:lnSpc>
+            </a:pPr>
+            <a:r>
+              <a:rPr lang="en-IN" dirty="0">
+                <a:solidFill>
+                  <a:schemeClr val="tx1">
+                    <a:lumMod val="95000"/>
+                  </a:schemeClr>
+                </a:solidFill>
+              </a:rPr>
+              <a:t>This could be a reason for the defaulters.</a:t>
+            </a:r>
+          </a:p>
+        </p:txBody>
+      </p:sp>
+      <p:pic>
+        <p:nvPicPr>
+          <p:cNvPr id="8196" name="Picture 4">
+            <a:extLst>
+              <a:ext uri="{FF2B5EF4-FFF2-40B4-BE49-F238E27FC236}">
+                <a16:creationId xmlns:a16="http://schemas.microsoft.com/office/drawing/2014/main" id="{300C986A-1338-6D23-D614-C1591A6DC02B}"/>
+              </a:ext>
+            </a:extLst>
+          </p:cNvPr>
+          <p:cNvPicPr>
+            <a:picLocks noChangeAspect="1" noChangeArrowheads="1"/>
+          </p:cNvPicPr>
+          <p:nvPr/>
+        </p:nvPicPr>
+        <p:blipFill>
+          <a:blip r:embed="rId2">
+            <a:extLst>
+              <a:ext uri="{28A0092B-C50C-407E-A947-70E740481C1C}">
+                <a14:useLocalDpi xmlns:a14="http://schemas.microsoft.com/office/drawing/2010/main" val="0"/>
+              </a:ext>
+            </a:extLst>
+          </a:blip>
+          <a:srcRect/>
+          <a:stretch>
+            <a:fillRect/>
+          </a:stretch>
+        </p:blipFill>
+        <p:spPr bwMode="auto">
+          <a:xfrm>
+            <a:off x="6096000" y="1547813"/>
+            <a:ext cx="5506208" cy="4376738"/>
+          </a:xfrm>
+          <a:prstGeom prst="rect">
+            <a:avLst/>
+          </a:prstGeom>
+          <a:noFill/>
+          <a:extLst>
+            <a:ext uri="{909E8E84-426E-40DD-AFC4-6F175D3DCCD1}">
+              <a14:hiddenFill xmlns:a14="http://schemas.microsoft.com/office/drawing/2010/main">
+                <a:solidFill>
+                  <a:srgbClr val="FFFFFF"/>
+                </a:solidFill>
+              </a14:hiddenFill>
+            </a:ext>
+          </a:extLst>
+        </p:spPr>
+      </p:pic>
+    </p:spTree>
+    <p:extLst>
+      <p:ext uri="{BB962C8B-B14F-4D97-AF65-F5344CB8AC3E}">
+        <p14:creationId xmlns:p14="http://schemas.microsoft.com/office/powerpoint/2010/main" val="4157932811"/>
+      </p:ext>
+    </p:extLst>
+  </p:cSld>
+  <p:clrMapOvr>
+    <a:masterClrMapping/>
+  </p:clrMapOvr>
+  <mc:AlternateContent xmlns:mc="http://schemas.openxmlformats.org/markup-compatibility/2006">
+    <mc:Choice xmlns:p14="http://schemas.microsoft.com/office/powerpoint/2010/main" Requires="p14">
+      <p:transition spd="med" p14:dur="700">
+        <p:fade/>
+      </p:transition>
+    </mc:Choice>
+    <mc:Fallback>
+      <p:transition spd="med">
+        <p:fade/>
+      </p:transition>
+    </mc:Fallback>
+  </mc:AlternateContent>
+</p:sld>
+</file>
+
+<file path=ppt/slides/slide15.xml><?xml version="1.0" encoding="utf-8"?>
+<p:sld xmlns:a="http://schemas.openxmlformats.org/drawingml/2006/main" xmlns:r="http://schemas.openxmlformats.org/officeDocument/2006/relationships" xmlns:p="http://schemas.openxmlformats.org/presentationml/2006/main">
+  <p:cSld>
+    <p:spTree>
+      <p:nvGrpSpPr>
+        <p:cNvPr id="1" name=""/>
+        <p:cNvGrpSpPr/>
+        <p:nvPr/>
+      </p:nvGrpSpPr>
+      <p:grpSpPr>
+        <a:xfrm>
+          <a:off x="0" y="0"/>
+          <a:ext cx="0" cy="0"/>
+          <a:chOff x="0" y="0"/>
+          <a:chExt cx="0" cy="0"/>
+        </a:xfrm>
+      </p:grpSpPr>
+      <p:sp>
+        <p:nvSpPr>
+          <p:cNvPr id="2" name="Title 1">
+            <a:extLst>
+              <a:ext uri="{FF2B5EF4-FFF2-40B4-BE49-F238E27FC236}">
+                <a16:creationId xmlns:a16="http://schemas.microsoft.com/office/drawing/2014/main" id="{00AFF480-C09C-EE59-8C9A-1991868B03F9}"/>
+              </a:ext>
+            </a:extLst>
+          </p:cNvPr>
+          <p:cNvSpPr>
+            <a:spLocks noGrp="1"/>
+          </p:cNvSpPr>
+          <p:nvPr>
+            <p:ph type="title"/>
+          </p:nvPr>
+        </p:nvSpPr>
+        <p:spPr>
+          <a:xfrm>
+            <a:off x="657224" y="499533"/>
+            <a:ext cx="10772775" cy="814917"/>
+          </a:xfrm>
+        </p:spPr>
+        <p:txBody>
+          <a:bodyPr/>
+          <a:lstStyle/>
+          <a:p>
+            <a:r>
+              <a:rPr lang="en-IN" dirty="0"/>
+              <a:t>Data Analysis</a:t>
+            </a:r>
+            <a:r>
+              <a:rPr lang="en-IN" sz="3600" dirty="0"/>
+              <a:t> – Issue Month &amp; Year</a:t>
+            </a:r>
+            <a:endParaRPr lang="en-IN" dirty="0"/>
+          </a:p>
+        </p:txBody>
+      </p:sp>
+      <p:sp>
+        <p:nvSpPr>
+          <p:cNvPr id="3" name="Content Placeholder 2">
+            <a:extLst>
+              <a:ext uri="{FF2B5EF4-FFF2-40B4-BE49-F238E27FC236}">
+                <a16:creationId xmlns:a16="http://schemas.microsoft.com/office/drawing/2014/main" id="{9AED37CA-F64D-4CE1-3D64-48A81505B507}"/>
+              </a:ext>
+            </a:extLst>
+          </p:cNvPr>
+          <p:cNvSpPr>
+            <a:spLocks noGrp="1"/>
+          </p:cNvSpPr>
+          <p:nvPr>
+            <p:ph idx="1"/>
+          </p:nvPr>
+        </p:nvSpPr>
+        <p:spPr>
+          <a:xfrm>
+            <a:off x="657224" y="5168746"/>
+            <a:ext cx="11344273" cy="1346354"/>
+          </a:xfrm>
+        </p:spPr>
+        <p:txBody>
+          <a:bodyPr>
+            <a:normAutofit fontScale="92500" lnSpcReduction="10000"/>
+          </a:bodyPr>
+          <a:lstStyle/>
+          <a:p>
+            <a:pPr>
+              <a:lnSpc>
+                <a:spcPct val="114000"/>
+              </a:lnSpc>
+            </a:pPr>
+            <a:r>
+              <a:rPr lang="en-IN" sz="2000" dirty="0">
+                <a:solidFill>
+                  <a:schemeClr val="tx1">
+                    <a:lumMod val="95000"/>
+                  </a:schemeClr>
+                </a:solidFill>
+              </a:rPr>
+              <a:t>We observe there is a consistent increase of loans issued YOY (Year-on-year).</a:t>
+            </a:r>
+          </a:p>
+          <a:p>
+            <a:pPr>
+              <a:lnSpc>
+                <a:spcPct val="114000"/>
+              </a:lnSpc>
+            </a:pPr>
+            <a:r>
+              <a:rPr lang="en-IN" sz="2000" dirty="0">
+                <a:solidFill>
+                  <a:schemeClr val="tx1">
+                    <a:lumMod val="95000"/>
+                  </a:schemeClr>
+                </a:solidFill>
+              </a:rPr>
+              <a:t>We observe most of the loans are taken during the year 2011.</a:t>
+            </a:r>
+          </a:p>
+          <a:p>
+            <a:pPr>
+              <a:lnSpc>
+                <a:spcPct val="114000"/>
+              </a:lnSpc>
+            </a:pPr>
+            <a:r>
+              <a:rPr lang="en-IN" sz="2000" dirty="0">
+                <a:solidFill>
+                  <a:schemeClr val="tx1">
+                    <a:lumMod val="95000"/>
+                  </a:schemeClr>
+                </a:solidFill>
+              </a:rPr>
+              <a:t>Also, most of the loans are issued during the December.</a:t>
+            </a:r>
+          </a:p>
+        </p:txBody>
+      </p:sp>
+      <p:pic>
+        <p:nvPicPr>
+          <p:cNvPr id="9218" name="Picture 2">
+            <a:extLst>
+              <a:ext uri="{FF2B5EF4-FFF2-40B4-BE49-F238E27FC236}">
+                <a16:creationId xmlns:a16="http://schemas.microsoft.com/office/drawing/2014/main" id="{AE2EABEA-1416-C67F-F853-810541EABE18}"/>
+              </a:ext>
+            </a:extLst>
+          </p:cNvPr>
+          <p:cNvPicPr>
+            <a:picLocks noChangeAspect="1" noChangeArrowheads="1"/>
+          </p:cNvPicPr>
+          <p:nvPr/>
+        </p:nvPicPr>
+        <p:blipFill>
+          <a:blip r:embed="rId2">
+            <a:extLst>
+              <a:ext uri="{28A0092B-C50C-407E-A947-70E740481C1C}">
+                <a14:useLocalDpi xmlns:a14="http://schemas.microsoft.com/office/drawing/2010/main" val="0"/>
+              </a:ext>
+            </a:extLst>
+          </a:blip>
+          <a:srcRect/>
+          <a:stretch>
+            <a:fillRect/>
+          </a:stretch>
+        </p:blipFill>
+        <p:spPr bwMode="auto">
+          <a:xfrm>
+            <a:off x="5329236" y="1512928"/>
+            <a:ext cx="4260058" cy="3276411"/>
+          </a:xfrm>
+          <a:prstGeom prst="rect">
+            <a:avLst/>
+          </a:prstGeom>
+          <a:noFill/>
+          <a:extLst>
+            <a:ext uri="{909E8E84-426E-40DD-AFC4-6F175D3DCCD1}">
+              <a14:hiddenFill xmlns:a14="http://schemas.microsoft.com/office/drawing/2010/main">
+                <a:solidFill>
+                  <a:srgbClr val="FFFFFF"/>
+                </a:solidFill>
+              </a14:hiddenFill>
+            </a:ext>
+          </a:extLst>
+        </p:spPr>
+      </p:pic>
+      <p:pic>
+        <p:nvPicPr>
+          <p:cNvPr id="9220" name="Picture 4">
+            <a:extLst>
+              <a:ext uri="{FF2B5EF4-FFF2-40B4-BE49-F238E27FC236}">
+                <a16:creationId xmlns:a16="http://schemas.microsoft.com/office/drawing/2014/main" id="{2A4E8F71-7E77-CD78-4EAE-8393208492D0}"/>
+              </a:ext>
+            </a:extLst>
+          </p:cNvPr>
+          <p:cNvPicPr>
+            <a:picLocks noChangeAspect="1" noChangeArrowheads="1"/>
+          </p:cNvPicPr>
+          <p:nvPr/>
+        </p:nvPicPr>
+        <p:blipFill>
+          <a:blip r:embed="rId3">
+            <a:extLst>
+              <a:ext uri="{28A0092B-C50C-407E-A947-70E740481C1C}">
+                <a14:useLocalDpi xmlns:a14="http://schemas.microsoft.com/office/drawing/2010/main" val="0"/>
+              </a:ext>
+            </a:extLst>
+          </a:blip>
+          <a:srcRect/>
+          <a:stretch>
+            <a:fillRect/>
+          </a:stretch>
+        </p:blipFill>
+        <p:spPr bwMode="auto">
+          <a:xfrm>
+            <a:off x="797718" y="1462088"/>
+            <a:ext cx="4260058" cy="3327252"/>
+          </a:xfrm>
+          <a:prstGeom prst="rect">
+            <a:avLst/>
+          </a:prstGeom>
+          <a:noFill/>
+          <a:extLst>
+            <a:ext uri="{909E8E84-426E-40DD-AFC4-6F175D3DCCD1}">
+              <a14:hiddenFill xmlns:a14="http://schemas.microsoft.com/office/drawing/2010/main">
+                <a:solidFill>
+                  <a:srgbClr val="FFFFFF"/>
+                </a:solidFill>
+              </a14:hiddenFill>
+            </a:ext>
+          </a:extLst>
+        </p:spPr>
+      </p:pic>
+    </p:spTree>
+    <p:extLst>
+      <p:ext uri="{BB962C8B-B14F-4D97-AF65-F5344CB8AC3E}">
+        <p14:creationId xmlns:p14="http://schemas.microsoft.com/office/powerpoint/2010/main" val="792256478"/>
+      </p:ext>
+    </p:extLst>
+  </p:cSld>
+  <p:clrMapOvr>
+    <a:masterClrMapping/>
+  </p:clrMapOvr>
+  <mc:AlternateContent xmlns:mc="http://schemas.openxmlformats.org/markup-compatibility/2006">
+    <mc:Choice xmlns:p14="http://schemas.microsoft.com/office/powerpoint/2010/main" Requires="p14">
+      <p:transition spd="med" p14:dur="700">
+        <p:fade/>
+      </p:transition>
+    </mc:Choice>
+    <mc:Fallback>
+      <p:transition spd="med">
+        <p:fade/>
+      </p:transition>
+    </mc:Fallback>
+  </mc:AlternateContent>
+</p:sld>
+</file>
+
+<file path=ppt/slides/slide16.xml><?xml version="1.0" encoding="utf-8"?>
+<p:sld xmlns:a="http://schemas.openxmlformats.org/drawingml/2006/main" xmlns:r="http://schemas.openxmlformats.org/officeDocument/2006/relationships" xmlns:p="http://schemas.openxmlformats.org/presentationml/2006/main">
+  <p:cSld>
+    <p:spTree>
+      <p:nvGrpSpPr>
+        <p:cNvPr id="1" name=""/>
+        <p:cNvGrpSpPr/>
+        <p:nvPr/>
+      </p:nvGrpSpPr>
+      <p:grpSpPr>
+        <a:xfrm>
+          <a:off x="0" y="0"/>
+          <a:ext cx="0" cy="0"/>
+          <a:chOff x="0" y="0"/>
+          <a:chExt cx="0" cy="0"/>
+        </a:xfrm>
+      </p:grpSpPr>
+      <p:sp>
+        <p:nvSpPr>
+          <p:cNvPr id="2" name="Title 1">
+            <a:extLst>
+              <a:ext uri="{FF2B5EF4-FFF2-40B4-BE49-F238E27FC236}">
+                <a16:creationId xmlns:a16="http://schemas.microsoft.com/office/drawing/2014/main" id="{00AFF480-C09C-EE59-8C9A-1991868B03F9}"/>
+              </a:ext>
+            </a:extLst>
+          </p:cNvPr>
+          <p:cNvSpPr>
+            <a:spLocks noGrp="1"/>
+          </p:cNvSpPr>
+          <p:nvPr>
+            <p:ph type="title"/>
+          </p:nvPr>
+        </p:nvSpPr>
+        <p:spPr>
+          <a:xfrm>
+            <a:off x="657224" y="499533"/>
+            <a:ext cx="10772775" cy="814917"/>
+          </a:xfrm>
+        </p:spPr>
+        <p:txBody>
+          <a:bodyPr/>
+          <a:lstStyle/>
+          <a:p>
+            <a:r>
+              <a:rPr lang="en-IN" dirty="0"/>
+              <a:t>Data Analysis</a:t>
+            </a:r>
+            <a:r>
+              <a:rPr lang="en-IN" sz="3600" dirty="0"/>
+              <a:t> – State</a:t>
+            </a:r>
+          </a:p>
+        </p:txBody>
+      </p:sp>
+      <p:sp>
+        <p:nvSpPr>
+          <p:cNvPr id="3" name="Content Placeholder 2">
+            <a:extLst>
+              <a:ext uri="{FF2B5EF4-FFF2-40B4-BE49-F238E27FC236}">
+                <a16:creationId xmlns:a16="http://schemas.microsoft.com/office/drawing/2014/main" id="{9AED37CA-F64D-4CE1-3D64-48A81505B507}"/>
+              </a:ext>
+            </a:extLst>
+          </p:cNvPr>
+          <p:cNvSpPr>
+            <a:spLocks noGrp="1"/>
+          </p:cNvSpPr>
+          <p:nvPr>
+            <p:ph idx="1"/>
+          </p:nvPr>
+        </p:nvSpPr>
+        <p:spPr>
+          <a:xfrm>
+            <a:off x="657224" y="5545238"/>
+            <a:ext cx="10753725" cy="598387"/>
+          </a:xfrm>
+        </p:spPr>
+        <p:txBody>
+          <a:bodyPr>
+            <a:normAutofit/>
+          </a:bodyPr>
+          <a:lstStyle/>
+          <a:p>
+            <a:r>
+              <a:rPr lang="en-IN" sz="2000" dirty="0">
+                <a:solidFill>
+                  <a:schemeClr val="tx1">
+                    <a:lumMod val="95000"/>
+                  </a:schemeClr>
+                </a:solidFill>
+              </a:rPr>
+              <a:t>The state CA has abnormally high amount of loans issued.</a:t>
+            </a:r>
+          </a:p>
+        </p:txBody>
+      </p:sp>
+      <p:pic>
+        <p:nvPicPr>
+          <p:cNvPr id="10242" name="Picture 2">
+            <a:extLst>
+              <a:ext uri="{FF2B5EF4-FFF2-40B4-BE49-F238E27FC236}">
+                <a16:creationId xmlns:a16="http://schemas.microsoft.com/office/drawing/2014/main" id="{07D8846D-4C5E-53F6-8B3A-FA429F7CF3EB}"/>
+              </a:ext>
+            </a:extLst>
+          </p:cNvPr>
+          <p:cNvPicPr>
+            <a:picLocks noChangeAspect="1" noChangeArrowheads="1"/>
+          </p:cNvPicPr>
+          <p:nvPr/>
+        </p:nvPicPr>
+        <p:blipFill>
+          <a:blip r:embed="rId2">
+            <a:extLst>
+              <a:ext uri="{28A0092B-C50C-407E-A947-70E740481C1C}">
+                <a14:useLocalDpi xmlns:a14="http://schemas.microsoft.com/office/drawing/2010/main" val="0"/>
+              </a:ext>
+            </a:extLst>
+          </a:blip>
+          <a:srcRect/>
+          <a:stretch>
+            <a:fillRect/>
+          </a:stretch>
+        </p:blipFill>
+        <p:spPr bwMode="auto">
+          <a:xfrm>
+            <a:off x="723899" y="1409700"/>
+            <a:ext cx="9972675" cy="3933994"/>
+          </a:xfrm>
+          <a:prstGeom prst="rect">
+            <a:avLst/>
+          </a:prstGeom>
+          <a:noFill/>
+          <a:extLst>
+            <a:ext uri="{909E8E84-426E-40DD-AFC4-6F175D3DCCD1}">
+              <a14:hiddenFill xmlns:a14="http://schemas.microsoft.com/office/drawing/2010/main">
+                <a:solidFill>
+                  <a:srgbClr val="FFFFFF"/>
+                </a:solidFill>
+              </a14:hiddenFill>
+            </a:ext>
+          </a:extLst>
+        </p:spPr>
+      </p:pic>
+    </p:spTree>
+    <p:extLst>
+      <p:ext uri="{BB962C8B-B14F-4D97-AF65-F5344CB8AC3E}">
+        <p14:creationId xmlns:p14="http://schemas.microsoft.com/office/powerpoint/2010/main" val="4086824581"/>
+      </p:ext>
+    </p:extLst>
+  </p:cSld>
+  <p:clrMapOvr>
+    <a:masterClrMapping/>
+  </p:clrMapOvr>
+  <mc:AlternateContent xmlns:mc="http://schemas.openxmlformats.org/markup-compatibility/2006">
+    <mc:Choice xmlns:p14="http://schemas.microsoft.com/office/powerpoint/2010/main" Requires="p14">
+      <p:transition spd="med" p14:dur="700">
+        <p:fade/>
+      </p:transition>
+    </mc:Choice>
+    <mc:Fallback>
+      <p:transition spd="med">
+        <p:fade/>
+      </p:transition>
+    </mc:Fallback>
+  </mc:AlternateContent>
+</p:sld>
+</file>
+
+<file path=ppt/slides/slide17.xml><?xml version="1.0" encoding="utf-8"?>
+<p:sld xmlns:a="http://schemas.openxmlformats.org/drawingml/2006/main" xmlns:r="http://schemas.openxmlformats.org/officeDocument/2006/relationships" xmlns:p="http://schemas.openxmlformats.org/presentationml/2006/main">
+  <p:cSld>
+    <p:spTree>
+      <p:nvGrpSpPr>
+        <p:cNvPr id="1" name=""/>
+        <p:cNvGrpSpPr/>
+        <p:nvPr/>
+      </p:nvGrpSpPr>
+      <p:grpSpPr>
+        <a:xfrm>
+          <a:off x="0" y="0"/>
+          <a:ext cx="0" cy="0"/>
+          <a:chOff x="0" y="0"/>
+          <a:chExt cx="0" cy="0"/>
+        </a:xfrm>
+      </p:grpSpPr>
+      <p:sp>
+        <p:nvSpPr>
+          <p:cNvPr id="2" name="Title 1">
+            <a:extLst>
+              <a:ext uri="{FF2B5EF4-FFF2-40B4-BE49-F238E27FC236}">
+                <a16:creationId xmlns:a16="http://schemas.microsoft.com/office/drawing/2014/main" id="{00AFF480-C09C-EE59-8C9A-1991868B03F9}"/>
+              </a:ext>
+            </a:extLst>
+          </p:cNvPr>
+          <p:cNvSpPr>
+            <a:spLocks noGrp="1"/>
+          </p:cNvSpPr>
+          <p:nvPr>
+            <p:ph type="title"/>
+          </p:nvPr>
+        </p:nvSpPr>
+        <p:spPr>
+          <a:xfrm>
+            <a:off x="657224" y="499533"/>
+            <a:ext cx="10772775" cy="814917"/>
+          </a:xfrm>
+        </p:spPr>
+        <p:txBody>
+          <a:bodyPr/>
+          <a:lstStyle/>
+          <a:p>
+            <a:r>
+              <a:rPr lang="en-IN" dirty="0"/>
+              <a:t>Data Analysis</a:t>
+            </a:r>
+            <a:r>
+              <a:rPr lang="en-IN" sz="3600" dirty="0"/>
+              <a:t> – State </a:t>
+            </a:r>
+            <a:r>
+              <a:rPr lang="en-IN" sz="2800" dirty="0"/>
+              <a:t>(contd.)</a:t>
+            </a:r>
+            <a:endParaRPr lang="en-IN" sz="3600" dirty="0"/>
+          </a:p>
+        </p:txBody>
+      </p:sp>
+      <p:sp>
+        <p:nvSpPr>
+          <p:cNvPr id="3" name="Content Placeholder 2">
+            <a:extLst>
+              <a:ext uri="{FF2B5EF4-FFF2-40B4-BE49-F238E27FC236}">
+                <a16:creationId xmlns:a16="http://schemas.microsoft.com/office/drawing/2014/main" id="{9AED37CA-F64D-4CE1-3D64-48A81505B507}"/>
+              </a:ext>
+            </a:extLst>
+          </p:cNvPr>
+          <p:cNvSpPr>
+            <a:spLocks noGrp="1"/>
+          </p:cNvSpPr>
+          <p:nvPr>
+            <p:ph idx="1"/>
+          </p:nvPr>
+        </p:nvSpPr>
+        <p:spPr>
+          <a:xfrm>
+            <a:off x="657224" y="5545238"/>
+            <a:ext cx="10753725" cy="598387"/>
+          </a:xfrm>
+        </p:spPr>
+        <p:txBody>
+          <a:bodyPr>
+            <a:normAutofit/>
+          </a:bodyPr>
+          <a:lstStyle/>
+          <a:p>
+            <a:r>
+              <a:rPr lang="en-IN" sz="2000" dirty="0">
+                <a:solidFill>
+                  <a:schemeClr val="tx1">
+                    <a:lumMod val="95000"/>
+                  </a:schemeClr>
+                </a:solidFill>
+              </a:rPr>
+              <a:t>We Observe that the State: NE has more % of loans charged off</a:t>
+            </a:r>
+          </a:p>
+        </p:txBody>
+      </p:sp>
+      <p:pic>
+        <p:nvPicPr>
+          <p:cNvPr id="11266" name="Picture 2">
+            <a:extLst>
+              <a:ext uri="{FF2B5EF4-FFF2-40B4-BE49-F238E27FC236}">
+                <a16:creationId xmlns:a16="http://schemas.microsoft.com/office/drawing/2014/main" id="{69464793-355D-96DB-5E48-D7EEE6915BA5}"/>
+              </a:ext>
+            </a:extLst>
+          </p:cNvPr>
+          <p:cNvPicPr>
+            <a:picLocks noChangeAspect="1" noChangeArrowheads="1"/>
+          </p:cNvPicPr>
+          <p:nvPr/>
+        </p:nvPicPr>
+        <p:blipFill>
+          <a:blip r:embed="rId2">
+            <a:extLst>
+              <a:ext uri="{28A0092B-C50C-407E-A947-70E740481C1C}">
+                <a14:useLocalDpi xmlns:a14="http://schemas.microsoft.com/office/drawing/2010/main" val="0"/>
+              </a:ext>
+            </a:extLst>
+          </a:blip>
+          <a:srcRect/>
+          <a:stretch>
+            <a:fillRect/>
+          </a:stretch>
+        </p:blipFill>
+        <p:spPr bwMode="auto">
+          <a:xfrm>
+            <a:off x="762001" y="1314449"/>
+            <a:ext cx="9877424" cy="4002487"/>
+          </a:xfrm>
+          <a:prstGeom prst="rect">
+            <a:avLst/>
+          </a:prstGeom>
+          <a:noFill/>
+          <a:extLst>
+            <a:ext uri="{909E8E84-426E-40DD-AFC4-6F175D3DCCD1}">
+              <a14:hiddenFill xmlns:a14="http://schemas.microsoft.com/office/drawing/2010/main">
+                <a:solidFill>
+                  <a:srgbClr val="FFFFFF"/>
+                </a:solidFill>
+              </a14:hiddenFill>
+            </a:ext>
+          </a:extLst>
+        </p:spPr>
+      </p:pic>
+    </p:spTree>
+    <p:extLst>
+      <p:ext uri="{BB962C8B-B14F-4D97-AF65-F5344CB8AC3E}">
+        <p14:creationId xmlns:p14="http://schemas.microsoft.com/office/powerpoint/2010/main" val="1899106958"/>
+      </p:ext>
+    </p:extLst>
+  </p:cSld>
+  <p:clrMapOvr>
+    <a:masterClrMapping/>
+  </p:clrMapOvr>
+  <mc:AlternateContent xmlns:mc="http://schemas.openxmlformats.org/markup-compatibility/2006">
+    <mc:Choice xmlns:p14="http://schemas.microsoft.com/office/powerpoint/2010/main" Requires="p14">
+      <p:transition spd="med" p14:dur="700">
+        <p:fade/>
+      </p:transition>
+    </mc:Choice>
+    <mc:Fallback>
+      <p:transition spd="med">
+        <p:fade/>
+      </p:transition>
+    </mc:Fallback>
+  </mc:AlternateContent>
+</p:sld>
+</file>
+
+<file path=ppt/slides/slide18.xml><?xml version="1.0" encoding="utf-8"?>
+<p:sld xmlns:a="http://schemas.openxmlformats.org/drawingml/2006/main" xmlns:r="http://schemas.openxmlformats.org/officeDocument/2006/relationships" xmlns:p="http://schemas.openxmlformats.org/presentationml/2006/main">
+  <p:cSld>
+    <p:spTree>
+      <p:nvGrpSpPr>
+        <p:cNvPr id="1" name=""/>
+        <p:cNvGrpSpPr/>
+        <p:nvPr/>
+      </p:nvGrpSpPr>
+      <p:grpSpPr>
+        <a:xfrm>
+          <a:off x="0" y="0"/>
+          <a:ext cx="0" cy="0"/>
+          <a:chOff x="0" y="0"/>
+          <a:chExt cx="0" cy="0"/>
+        </a:xfrm>
+      </p:grpSpPr>
+      <p:sp>
+        <p:nvSpPr>
+          <p:cNvPr id="2" name="Title 1">
+            <a:extLst>
+              <a:ext uri="{FF2B5EF4-FFF2-40B4-BE49-F238E27FC236}">
+                <a16:creationId xmlns:a16="http://schemas.microsoft.com/office/drawing/2014/main" id="{00AFF480-C09C-EE59-8C9A-1991868B03F9}"/>
+              </a:ext>
+            </a:extLst>
+          </p:cNvPr>
+          <p:cNvSpPr>
+            <a:spLocks noGrp="1"/>
+          </p:cNvSpPr>
+          <p:nvPr>
+            <p:ph type="title"/>
+          </p:nvPr>
+        </p:nvSpPr>
+        <p:spPr>
+          <a:xfrm>
+            <a:off x="657224" y="499533"/>
+            <a:ext cx="10772775" cy="814917"/>
+          </a:xfrm>
+        </p:spPr>
+        <p:txBody>
+          <a:bodyPr/>
+          <a:lstStyle/>
+          <a:p>
+            <a:r>
+              <a:rPr lang="en-IN" dirty="0"/>
+              <a:t>Data Analysis</a:t>
+            </a:r>
+            <a:r>
+              <a:rPr lang="en-IN" sz="3600" dirty="0"/>
+              <a:t> – Grade</a:t>
+            </a:r>
+          </a:p>
+        </p:txBody>
+      </p:sp>
+      <p:sp>
+        <p:nvSpPr>
+          <p:cNvPr id="3" name="Content Placeholder 2">
+            <a:extLst>
+              <a:ext uri="{FF2B5EF4-FFF2-40B4-BE49-F238E27FC236}">
+                <a16:creationId xmlns:a16="http://schemas.microsoft.com/office/drawing/2014/main" id="{9AED37CA-F64D-4CE1-3D64-48A81505B507}"/>
+              </a:ext>
+            </a:extLst>
+          </p:cNvPr>
+          <p:cNvSpPr>
+            <a:spLocks noGrp="1"/>
+          </p:cNvSpPr>
+          <p:nvPr>
+            <p:ph idx="1"/>
+          </p:nvPr>
+        </p:nvSpPr>
+        <p:spPr>
+          <a:xfrm>
+            <a:off x="657224" y="5222450"/>
+            <a:ext cx="10753725" cy="921176"/>
+          </a:xfrm>
+        </p:spPr>
+        <p:txBody>
+          <a:bodyPr>
+            <a:normAutofit/>
+          </a:bodyPr>
+          <a:lstStyle/>
+          <a:p>
+            <a:r>
+              <a:rPr lang="en-IN" sz="2000" dirty="0">
+                <a:solidFill>
+                  <a:schemeClr val="tx1">
+                    <a:lumMod val="95000"/>
+                  </a:schemeClr>
+                </a:solidFill>
+              </a:rPr>
+              <a:t>Most of the loans issued are under grade B;</a:t>
+            </a:r>
+          </a:p>
+          <a:p>
+            <a:r>
+              <a:rPr lang="en-IN" sz="2000" dirty="0">
+                <a:solidFill>
+                  <a:schemeClr val="tx1">
+                    <a:lumMod val="95000"/>
+                  </a:schemeClr>
+                </a:solidFill>
+              </a:rPr>
+              <a:t>While more % of loans are charged off under the grade G.</a:t>
+            </a:r>
+          </a:p>
+        </p:txBody>
+      </p:sp>
+      <p:pic>
+        <p:nvPicPr>
+          <p:cNvPr id="12290" name="Picture 2">
+            <a:extLst>
+              <a:ext uri="{FF2B5EF4-FFF2-40B4-BE49-F238E27FC236}">
+                <a16:creationId xmlns:a16="http://schemas.microsoft.com/office/drawing/2014/main" id="{3605961B-CC64-F3F1-A5FD-53398F17D36C}"/>
+              </a:ext>
+            </a:extLst>
+          </p:cNvPr>
+          <p:cNvPicPr>
+            <a:picLocks noChangeAspect="1" noChangeArrowheads="1"/>
+          </p:cNvPicPr>
+          <p:nvPr/>
+        </p:nvPicPr>
+        <p:blipFill>
+          <a:blip r:embed="rId2">
+            <a:extLst>
+              <a:ext uri="{28A0092B-C50C-407E-A947-70E740481C1C}">
+                <a14:useLocalDpi xmlns:a14="http://schemas.microsoft.com/office/drawing/2010/main" val="0"/>
+              </a:ext>
+            </a:extLst>
+          </a:blip>
+          <a:srcRect/>
+          <a:stretch>
+            <a:fillRect/>
+          </a:stretch>
+        </p:blipFill>
+        <p:spPr bwMode="auto">
+          <a:xfrm>
+            <a:off x="5333526" y="1903596"/>
+            <a:ext cx="3791621" cy="3050807"/>
+          </a:xfrm>
+          <a:prstGeom prst="rect">
+            <a:avLst/>
+          </a:prstGeom>
+          <a:noFill/>
+          <a:extLst>
+            <a:ext uri="{909E8E84-426E-40DD-AFC4-6F175D3DCCD1}">
+              <a14:hiddenFill xmlns:a14="http://schemas.microsoft.com/office/drawing/2010/main">
+                <a:solidFill>
+                  <a:srgbClr val="FFFFFF"/>
+                </a:solidFill>
+              </a14:hiddenFill>
+            </a:ext>
+          </a:extLst>
+        </p:spPr>
+      </p:pic>
+      <p:pic>
+        <p:nvPicPr>
+          <p:cNvPr id="12294" name="Picture 6">
+            <a:extLst>
+              <a:ext uri="{FF2B5EF4-FFF2-40B4-BE49-F238E27FC236}">
+                <a16:creationId xmlns:a16="http://schemas.microsoft.com/office/drawing/2014/main" id="{66C329A1-8749-66E1-BBD1-691ED5133583}"/>
+              </a:ext>
+            </a:extLst>
+          </p:cNvPr>
+          <p:cNvPicPr>
+            <a:picLocks noChangeAspect="1" noChangeArrowheads="1"/>
+          </p:cNvPicPr>
+          <p:nvPr/>
+        </p:nvPicPr>
+        <p:blipFill>
+          <a:blip r:embed="rId3">
+            <a:extLst>
+              <a:ext uri="{28A0092B-C50C-407E-A947-70E740481C1C}">
+                <a14:useLocalDpi xmlns:a14="http://schemas.microsoft.com/office/drawing/2010/main" val="0"/>
+              </a:ext>
+            </a:extLst>
+          </a:blip>
+          <a:srcRect/>
+          <a:stretch>
+            <a:fillRect/>
+          </a:stretch>
+        </p:blipFill>
+        <p:spPr bwMode="auto">
+          <a:xfrm>
+            <a:off x="790478" y="1899859"/>
+            <a:ext cx="3932351" cy="3024372"/>
+          </a:xfrm>
+          <a:prstGeom prst="rect">
+            <a:avLst/>
+          </a:prstGeom>
+          <a:noFill/>
+          <a:extLst>
+            <a:ext uri="{909E8E84-426E-40DD-AFC4-6F175D3DCCD1}">
+              <a14:hiddenFill xmlns:a14="http://schemas.microsoft.com/office/drawing/2010/main">
+                <a:solidFill>
+                  <a:srgbClr val="FFFFFF"/>
+                </a:solidFill>
+              </a14:hiddenFill>
+            </a:ext>
+          </a:extLst>
+        </p:spPr>
+      </p:pic>
+    </p:spTree>
+    <p:extLst>
+      <p:ext uri="{BB962C8B-B14F-4D97-AF65-F5344CB8AC3E}">
+        <p14:creationId xmlns:p14="http://schemas.microsoft.com/office/powerpoint/2010/main" val="520533789"/>
+      </p:ext>
+    </p:extLst>
+  </p:cSld>
+  <p:clrMapOvr>
+    <a:masterClrMapping/>
+  </p:clrMapOvr>
+  <mc:AlternateContent xmlns:mc="http://schemas.openxmlformats.org/markup-compatibility/2006">
+    <mc:Choice xmlns:p14="http://schemas.microsoft.com/office/powerpoint/2010/main" Requires="p14">
+      <p:transition spd="med" p14:dur="700">
+        <p:fade/>
+      </p:transition>
+    </mc:Choice>
+    <mc:Fallback>
+      <p:transition spd="med">
+        <p:fade/>
+      </p:transition>
+    </mc:Fallback>
+  </mc:AlternateContent>
+</p:sld>
+</file>
+
+<file path=ppt/slides/slide19.xml><?xml version="1.0" encoding="utf-8"?>
+<p:sld xmlns:a="http://schemas.openxmlformats.org/drawingml/2006/main" xmlns:r="http://schemas.openxmlformats.org/officeDocument/2006/relationships" xmlns:p="http://schemas.openxmlformats.org/presentationml/2006/main">
+  <p:cSld>
+    <p:spTree>
+      <p:nvGrpSpPr>
+        <p:cNvPr id="1" name=""/>
+        <p:cNvGrpSpPr/>
+        <p:nvPr/>
+      </p:nvGrpSpPr>
+      <p:grpSpPr>
+        <a:xfrm>
+          <a:off x="0" y="0"/>
+          <a:ext cx="0" cy="0"/>
+          <a:chOff x="0" y="0"/>
+          <a:chExt cx="0" cy="0"/>
+        </a:xfrm>
+      </p:grpSpPr>
+      <p:sp>
+        <p:nvSpPr>
+          <p:cNvPr id="2" name="Title 1">
+            <a:extLst>
+              <a:ext uri="{FF2B5EF4-FFF2-40B4-BE49-F238E27FC236}">
+                <a16:creationId xmlns:a16="http://schemas.microsoft.com/office/drawing/2014/main" id="{00AFF480-C09C-EE59-8C9A-1991868B03F9}"/>
+              </a:ext>
+            </a:extLst>
+          </p:cNvPr>
+          <p:cNvSpPr>
+            <a:spLocks noGrp="1"/>
+          </p:cNvSpPr>
+          <p:nvPr>
+            <p:ph type="title"/>
+          </p:nvPr>
+        </p:nvSpPr>
+        <p:spPr>
+          <a:xfrm>
+            <a:off x="657224" y="499533"/>
+            <a:ext cx="10772775" cy="814917"/>
+          </a:xfrm>
+        </p:spPr>
+        <p:txBody>
+          <a:bodyPr/>
+          <a:lstStyle/>
+          <a:p>
+            <a:r>
+              <a:rPr lang="en-IN" dirty="0"/>
+              <a:t>Data Analysis</a:t>
+            </a:r>
+            <a:r>
+              <a:rPr lang="en-IN" sz="3600" dirty="0"/>
+              <a:t> – Sub-Grade</a:t>
+            </a:r>
+          </a:p>
+        </p:txBody>
+      </p:sp>
+      <p:sp>
+        <p:nvSpPr>
+          <p:cNvPr id="3" name="Content Placeholder 2">
+            <a:extLst>
+              <a:ext uri="{FF2B5EF4-FFF2-40B4-BE49-F238E27FC236}">
+                <a16:creationId xmlns:a16="http://schemas.microsoft.com/office/drawing/2014/main" id="{9AED37CA-F64D-4CE1-3D64-48A81505B507}"/>
+              </a:ext>
+            </a:extLst>
+          </p:cNvPr>
+          <p:cNvSpPr>
+            <a:spLocks noGrp="1"/>
+          </p:cNvSpPr>
+          <p:nvPr>
+            <p:ph idx="1"/>
+          </p:nvPr>
+        </p:nvSpPr>
+        <p:spPr>
+          <a:xfrm>
+            <a:off x="657224" y="5222450"/>
+            <a:ext cx="10753725" cy="921176"/>
+          </a:xfrm>
+        </p:spPr>
+        <p:txBody>
+          <a:bodyPr>
+            <a:normAutofit/>
+          </a:bodyPr>
+          <a:lstStyle/>
+          <a:p>
+            <a:r>
+              <a:rPr lang="en-IN" sz="2000" dirty="0">
+                <a:solidFill>
+                  <a:schemeClr val="tx1">
+                    <a:lumMod val="95000"/>
+                  </a:schemeClr>
+                </a:solidFill>
+              </a:rPr>
+              <a:t>The sub-Grades F5 has more % of loans Charged Off. </a:t>
+            </a:r>
+          </a:p>
+          <a:p>
+            <a:r>
+              <a:rPr lang="en-IN" sz="2000" dirty="0">
+                <a:solidFill>
+                  <a:schemeClr val="tx1">
+                    <a:lumMod val="95000"/>
+                  </a:schemeClr>
+                </a:solidFill>
+              </a:rPr>
+              <a:t>The Sub-Grades G2, G2, G3, G5 seems to be at the top of the loans being Charged Off.</a:t>
+            </a:r>
+          </a:p>
+        </p:txBody>
+      </p:sp>
+      <p:pic>
+        <p:nvPicPr>
+          <p:cNvPr id="13316" name="Picture 4">
+            <a:extLst>
+              <a:ext uri="{FF2B5EF4-FFF2-40B4-BE49-F238E27FC236}">
+                <a16:creationId xmlns:a16="http://schemas.microsoft.com/office/drawing/2014/main" id="{49233F20-67B3-5226-71FA-6EE5DF1BA622}"/>
+              </a:ext>
+            </a:extLst>
+          </p:cNvPr>
+          <p:cNvPicPr>
+            <a:picLocks noChangeAspect="1" noChangeArrowheads="1"/>
+          </p:cNvPicPr>
+          <p:nvPr/>
+        </p:nvPicPr>
+        <p:blipFill>
+          <a:blip r:embed="rId2">
+            <a:extLst>
+              <a:ext uri="{28A0092B-C50C-407E-A947-70E740481C1C}">
+                <a14:useLocalDpi xmlns:a14="http://schemas.microsoft.com/office/drawing/2010/main" val="0"/>
+              </a:ext>
+            </a:extLst>
+          </a:blip>
+          <a:srcRect/>
+          <a:stretch>
+            <a:fillRect/>
+          </a:stretch>
+        </p:blipFill>
+        <p:spPr bwMode="auto">
+          <a:xfrm>
+            <a:off x="790221" y="1408669"/>
+            <a:ext cx="10931044" cy="3477655"/>
+          </a:xfrm>
+          <a:prstGeom prst="rect">
+            <a:avLst/>
+          </a:prstGeom>
+          <a:noFill/>
+          <a:extLst>
+            <a:ext uri="{909E8E84-426E-40DD-AFC4-6F175D3DCCD1}">
+              <a14:hiddenFill xmlns:a14="http://schemas.microsoft.com/office/drawing/2010/main">
+                <a:solidFill>
+                  <a:srgbClr val="FFFFFF"/>
+                </a:solidFill>
+              </a14:hiddenFill>
+            </a:ext>
+          </a:extLst>
+        </p:spPr>
+      </p:pic>
+    </p:spTree>
+    <p:extLst>
+      <p:ext uri="{BB962C8B-B14F-4D97-AF65-F5344CB8AC3E}">
+        <p14:creationId xmlns:p14="http://schemas.microsoft.com/office/powerpoint/2010/main" val="2272296879"/>
+      </p:ext>
+    </p:extLst>
+  </p:cSld>
+  <p:clrMapOvr>
+    <a:masterClrMapping/>
+  </p:clrMapOvr>
+  <mc:AlternateContent xmlns:mc="http://schemas.openxmlformats.org/markup-compatibility/2006">
+    <mc:Choice xmlns:p14="http://schemas.microsoft.com/office/powerpoint/2010/main" Requires="p14">
+      <p:transition spd="med" p14:dur="700">
+        <p:fade/>
+      </p:transition>
+    </mc:Choice>
+    <mc:Fallback>
+      <p:transition spd="med">
+        <p:fade/>
+      </p:transition>
+    </mc:Fallback>
+  </mc:AlternateContent>
+</p:sld>
+</file>
+
 <file path=ppt/slides/slide2.xml><?xml version="1.0" encoding="utf-8"?>
 <p:sld xmlns:a="http://schemas.openxmlformats.org/drawingml/2006/main" xmlns:r="http://schemas.openxmlformats.org/officeDocument/2006/relationships" xmlns:p="http://schemas.openxmlformats.org/presentationml/2006/main">
   <p:cSld>
@@ -9519,6 +11794,726 @@
     <p:extLst>
       <p:ext uri="{BB962C8B-B14F-4D97-AF65-F5344CB8AC3E}">
         <p14:creationId xmlns:p14="http://schemas.microsoft.com/office/powerpoint/2010/main" val="4001121652"/>
+      </p:ext>
+    </p:extLst>
+  </p:cSld>
+  <p:clrMapOvr>
+    <a:masterClrMapping/>
+  </p:clrMapOvr>
+  <mc:AlternateContent xmlns:mc="http://schemas.openxmlformats.org/markup-compatibility/2006" xmlns:p14="http://schemas.microsoft.com/office/powerpoint/2010/main">
+    <mc:Choice Requires="p14">
+      <p:transition spd="med" p14:dur="700">
+        <p:fade/>
+      </p:transition>
+    </mc:Choice>
+    <mc:Fallback xmlns="">
+      <p:transition spd="med">
+        <p:fade/>
+      </p:transition>
+    </mc:Fallback>
+  </mc:AlternateContent>
+</p:sld>
+</file>
+
+<file path=ppt/slides/slide20.xml><?xml version="1.0" encoding="utf-8"?>
+<p:sld xmlns:a="http://schemas.openxmlformats.org/drawingml/2006/main" xmlns:r="http://schemas.openxmlformats.org/officeDocument/2006/relationships" xmlns:p="http://schemas.openxmlformats.org/presentationml/2006/main">
+  <p:cSld>
+    <p:spTree>
+      <p:nvGrpSpPr>
+        <p:cNvPr id="1" name=""/>
+        <p:cNvGrpSpPr/>
+        <p:nvPr/>
+      </p:nvGrpSpPr>
+      <p:grpSpPr>
+        <a:xfrm>
+          <a:off x="0" y="0"/>
+          <a:ext cx="0" cy="0"/>
+          <a:chOff x="0" y="0"/>
+          <a:chExt cx="0" cy="0"/>
+        </a:xfrm>
+      </p:grpSpPr>
+      <p:sp>
+        <p:nvSpPr>
+          <p:cNvPr id="2" name="Title 1">
+            <a:extLst>
+              <a:ext uri="{FF2B5EF4-FFF2-40B4-BE49-F238E27FC236}">
+                <a16:creationId xmlns:a16="http://schemas.microsoft.com/office/drawing/2014/main" id="{00AFF480-C09C-EE59-8C9A-1991868B03F9}"/>
+              </a:ext>
+            </a:extLst>
+          </p:cNvPr>
+          <p:cNvSpPr>
+            <a:spLocks noGrp="1"/>
+          </p:cNvSpPr>
+          <p:nvPr>
+            <p:ph type="title"/>
+          </p:nvPr>
+        </p:nvSpPr>
+        <p:spPr>
+          <a:xfrm>
+            <a:off x="657224" y="499533"/>
+            <a:ext cx="10772775" cy="814917"/>
+          </a:xfrm>
+        </p:spPr>
+        <p:txBody>
+          <a:bodyPr/>
+          <a:lstStyle/>
+          <a:p>
+            <a:r>
+              <a:rPr lang="en-IN" dirty="0"/>
+              <a:t>Data Analysis</a:t>
+            </a:r>
+            <a:r>
+              <a:rPr lang="en-IN" sz="3600" dirty="0"/>
+              <a:t> – Home Ownership</a:t>
+            </a:r>
+          </a:p>
+        </p:txBody>
+      </p:sp>
+      <p:sp>
+        <p:nvSpPr>
+          <p:cNvPr id="3" name="Content Placeholder 2">
+            <a:extLst>
+              <a:ext uri="{FF2B5EF4-FFF2-40B4-BE49-F238E27FC236}">
+                <a16:creationId xmlns:a16="http://schemas.microsoft.com/office/drawing/2014/main" id="{9AED37CA-F64D-4CE1-3D64-48A81505B507}"/>
+              </a:ext>
+            </a:extLst>
+          </p:cNvPr>
+          <p:cNvSpPr>
+            <a:spLocks noGrp="1"/>
+          </p:cNvSpPr>
+          <p:nvPr>
+            <p:ph idx="1"/>
+          </p:nvPr>
+        </p:nvSpPr>
+        <p:spPr>
+          <a:xfrm>
+            <a:off x="5392132" y="1397768"/>
+            <a:ext cx="5448693" cy="3692706"/>
+          </a:xfrm>
+        </p:spPr>
+        <p:txBody>
+          <a:bodyPr>
+            <a:normAutofit/>
+          </a:bodyPr>
+          <a:lstStyle/>
+          <a:p>
+            <a:pPr>
+              <a:lnSpc>
+                <a:spcPct val="114000"/>
+              </a:lnSpc>
+            </a:pPr>
+            <a:r>
+              <a:rPr lang="en-IN" sz="2000" dirty="0">
+                <a:solidFill>
+                  <a:schemeClr val="tx1">
+                    <a:lumMod val="95000"/>
+                  </a:schemeClr>
+                </a:solidFill>
+              </a:rPr>
+              <a:t>More loans are given to the people who have </a:t>
+            </a:r>
+            <a:r>
+              <a:rPr lang="en-IN" sz="2000" b="1" dirty="0">
+                <a:solidFill>
+                  <a:schemeClr val="tx1">
+                    <a:lumMod val="95000"/>
+                  </a:schemeClr>
+                </a:solidFill>
+              </a:rPr>
+              <a:t>home Ownership – Rent</a:t>
+            </a:r>
+            <a:r>
+              <a:rPr lang="en-IN" sz="2000" dirty="0">
+                <a:solidFill>
+                  <a:schemeClr val="tx1">
+                    <a:lumMod val="95000"/>
+                  </a:schemeClr>
+                </a:solidFill>
+              </a:rPr>
+              <a:t> and are also charged off more.</a:t>
+            </a:r>
+          </a:p>
+          <a:p>
+            <a:pPr>
+              <a:lnSpc>
+                <a:spcPct val="114000"/>
+              </a:lnSpc>
+            </a:pPr>
+            <a:r>
+              <a:rPr lang="en-IN" sz="2000" dirty="0">
+                <a:solidFill>
+                  <a:schemeClr val="tx1">
+                    <a:lumMod val="95000"/>
+                  </a:schemeClr>
+                </a:solidFill>
+              </a:rPr>
+              <a:t>On Further analysis, the loans with </a:t>
+            </a:r>
+            <a:r>
+              <a:rPr lang="en-IN" sz="2000" b="1" dirty="0" err="1">
+                <a:solidFill>
+                  <a:schemeClr val="tx1">
+                    <a:lumMod val="95000"/>
+                  </a:schemeClr>
+                </a:solidFill>
+              </a:rPr>
+              <a:t>home_ownership</a:t>
+            </a:r>
+            <a:r>
+              <a:rPr lang="en-IN" sz="2000" dirty="0">
+                <a:solidFill>
+                  <a:schemeClr val="tx1">
+                    <a:lumMod val="95000"/>
+                  </a:schemeClr>
+                </a:solidFill>
+              </a:rPr>
+              <a:t> mentioned as OTHER have a higher rate of Charged Off.</a:t>
+            </a:r>
+          </a:p>
+        </p:txBody>
+      </p:sp>
+      <p:pic>
+        <p:nvPicPr>
+          <p:cNvPr id="14342" name="Picture 6">
+            <a:extLst>
+              <a:ext uri="{FF2B5EF4-FFF2-40B4-BE49-F238E27FC236}">
+                <a16:creationId xmlns:a16="http://schemas.microsoft.com/office/drawing/2014/main" id="{D151D607-24D5-6955-3CBC-B3E581B582F9}"/>
+              </a:ext>
+            </a:extLst>
+          </p:cNvPr>
+          <p:cNvPicPr>
+            <a:picLocks noChangeAspect="1" noChangeArrowheads="1"/>
+          </p:cNvPicPr>
+          <p:nvPr/>
+        </p:nvPicPr>
+        <p:blipFill>
+          <a:blip r:embed="rId2">
+            <a:extLst>
+              <a:ext uri="{28A0092B-C50C-407E-A947-70E740481C1C}">
+                <a14:useLocalDpi xmlns:a14="http://schemas.microsoft.com/office/drawing/2010/main" val="0"/>
+              </a:ext>
+            </a:extLst>
+          </a:blip>
+          <a:srcRect/>
+          <a:stretch>
+            <a:fillRect/>
+          </a:stretch>
+        </p:blipFill>
+        <p:spPr bwMode="auto">
+          <a:xfrm>
+            <a:off x="712950" y="4282967"/>
+            <a:ext cx="4191000" cy="2257425"/>
+          </a:xfrm>
+          <a:prstGeom prst="rect">
+            <a:avLst/>
+          </a:prstGeom>
+          <a:noFill/>
+          <a:extLst>
+            <a:ext uri="{909E8E84-426E-40DD-AFC4-6F175D3DCCD1}">
+              <a14:hiddenFill xmlns:a14="http://schemas.microsoft.com/office/drawing/2010/main">
+                <a:solidFill>
+                  <a:srgbClr val="FFFFFF"/>
+                </a:solidFill>
+              </a14:hiddenFill>
+            </a:ext>
+          </a:extLst>
+        </p:spPr>
+      </p:pic>
+      <p:pic>
+        <p:nvPicPr>
+          <p:cNvPr id="14344" name="Picture 8">
+            <a:extLst>
+              <a:ext uri="{FF2B5EF4-FFF2-40B4-BE49-F238E27FC236}">
+                <a16:creationId xmlns:a16="http://schemas.microsoft.com/office/drawing/2014/main" id="{5BFC26E7-FDEA-8CB0-1D35-CA6F900CA608}"/>
+              </a:ext>
+            </a:extLst>
+          </p:cNvPr>
+          <p:cNvPicPr>
+            <a:picLocks noChangeAspect="1" noChangeArrowheads="1"/>
+          </p:cNvPicPr>
+          <p:nvPr/>
+        </p:nvPicPr>
+        <p:blipFill>
+          <a:blip r:embed="rId3">
+            <a:extLst>
+              <a:ext uri="{28A0092B-C50C-407E-A947-70E740481C1C}">
+                <a14:useLocalDpi xmlns:a14="http://schemas.microsoft.com/office/drawing/2010/main" val="0"/>
+              </a:ext>
+            </a:extLst>
+          </a:blip>
+          <a:srcRect/>
+          <a:stretch>
+            <a:fillRect/>
+          </a:stretch>
+        </p:blipFill>
+        <p:spPr bwMode="auto">
+          <a:xfrm>
+            <a:off x="712950" y="1397768"/>
+            <a:ext cx="4191000" cy="2801881"/>
+          </a:xfrm>
+          <a:prstGeom prst="rect">
+            <a:avLst/>
+          </a:prstGeom>
+          <a:noFill/>
+          <a:extLst>
+            <a:ext uri="{909E8E84-426E-40DD-AFC4-6F175D3DCCD1}">
+              <a14:hiddenFill xmlns:a14="http://schemas.microsoft.com/office/drawing/2010/main">
+                <a:solidFill>
+                  <a:srgbClr val="FFFFFF"/>
+                </a:solidFill>
+              </a14:hiddenFill>
+            </a:ext>
+          </a:extLst>
+        </p:spPr>
+      </p:pic>
+    </p:spTree>
+    <p:extLst>
+      <p:ext uri="{BB962C8B-B14F-4D97-AF65-F5344CB8AC3E}">
+        <p14:creationId xmlns:p14="http://schemas.microsoft.com/office/powerpoint/2010/main" val="3049603710"/>
+      </p:ext>
+    </p:extLst>
+  </p:cSld>
+  <p:clrMapOvr>
+    <a:masterClrMapping/>
+  </p:clrMapOvr>
+  <mc:AlternateContent xmlns:mc="http://schemas.openxmlformats.org/markup-compatibility/2006">
+    <mc:Choice xmlns:p14="http://schemas.microsoft.com/office/powerpoint/2010/main" Requires="p14">
+      <p:transition spd="med" p14:dur="700">
+        <p:fade/>
+      </p:transition>
+    </mc:Choice>
+    <mc:Fallback>
+      <p:transition spd="med">
+        <p:fade/>
+      </p:transition>
+    </mc:Fallback>
+  </mc:AlternateContent>
+</p:sld>
+</file>
+
+<file path=ppt/slides/slide21.xml><?xml version="1.0" encoding="utf-8"?>
+<p:sld xmlns:a="http://schemas.openxmlformats.org/drawingml/2006/main" xmlns:r="http://schemas.openxmlformats.org/officeDocument/2006/relationships" xmlns:p="http://schemas.openxmlformats.org/presentationml/2006/main">
+  <p:cSld>
+    <p:spTree>
+      <p:nvGrpSpPr>
+        <p:cNvPr id="1" name=""/>
+        <p:cNvGrpSpPr/>
+        <p:nvPr/>
+      </p:nvGrpSpPr>
+      <p:grpSpPr>
+        <a:xfrm>
+          <a:off x="0" y="0"/>
+          <a:ext cx="0" cy="0"/>
+          <a:chOff x="0" y="0"/>
+          <a:chExt cx="0" cy="0"/>
+        </a:xfrm>
+      </p:grpSpPr>
+      <p:sp>
+        <p:nvSpPr>
+          <p:cNvPr id="2" name="Title 1">
+            <a:extLst>
+              <a:ext uri="{FF2B5EF4-FFF2-40B4-BE49-F238E27FC236}">
+                <a16:creationId xmlns:a16="http://schemas.microsoft.com/office/drawing/2014/main" id="{E4660895-E842-C3C9-6C5E-E0D106CFC53F}"/>
+              </a:ext>
+            </a:extLst>
+          </p:cNvPr>
+          <p:cNvSpPr>
+            <a:spLocks noGrp="1"/>
+          </p:cNvSpPr>
+          <p:nvPr>
+            <p:ph type="title"/>
+          </p:nvPr>
+        </p:nvSpPr>
+        <p:spPr>
+          <a:xfrm>
+            <a:off x="657224" y="499533"/>
+            <a:ext cx="10772775" cy="886207"/>
+          </a:xfrm>
+        </p:spPr>
+        <p:txBody>
+          <a:bodyPr/>
+          <a:lstStyle/>
+          <a:p>
+            <a:r>
+              <a:rPr lang="en-IN" dirty="0"/>
+              <a:t>Summary of Analysis</a:t>
+            </a:r>
+          </a:p>
+        </p:txBody>
+      </p:sp>
+      <p:sp>
+        <p:nvSpPr>
+          <p:cNvPr id="3" name="Content Placeholder 2">
+            <a:extLst>
+              <a:ext uri="{FF2B5EF4-FFF2-40B4-BE49-F238E27FC236}">
+                <a16:creationId xmlns:a16="http://schemas.microsoft.com/office/drawing/2014/main" id="{AD369338-DBB3-81D3-B98B-BABA682E0382}"/>
+              </a:ext>
+            </a:extLst>
+          </p:cNvPr>
+          <p:cNvSpPr>
+            <a:spLocks noGrp="1"/>
+          </p:cNvSpPr>
+          <p:nvPr>
+            <p:ph idx="1"/>
+          </p:nvPr>
+        </p:nvSpPr>
+        <p:spPr>
+          <a:xfrm>
+            <a:off x="676656" y="1470581"/>
+            <a:ext cx="10753725" cy="5073093"/>
+          </a:xfrm>
+        </p:spPr>
+        <p:txBody>
+          <a:bodyPr>
+            <a:normAutofit lnSpcReduction="10000"/>
+          </a:bodyPr>
+          <a:lstStyle/>
+          <a:p>
+            <a:r>
+              <a:rPr lang="en-IN" b="1" dirty="0">
+                <a:solidFill>
+                  <a:schemeClr val="tx1">
+                    <a:lumMod val="95000"/>
+                  </a:schemeClr>
+                </a:solidFill>
+              </a:rPr>
+              <a:t>Investor funded Amount</a:t>
+            </a:r>
+            <a:r>
+              <a:rPr lang="en-IN" dirty="0">
+                <a:solidFill>
+                  <a:schemeClr val="tx1">
+                    <a:lumMod val="95000"/>
+                  </a:schemeClr>
+                </a:solidFill>
+              </a:rPr>
+              <a:t> range between </a:t>
+            </a:r>
+            <a:r>
+              <a:rPr lang="en-IN" b="1" dirty="0">
+                <a:solidFill>
+                  <a:schemeClr val="tx1">
+                    <a:lumMod val="95000"/>
+                  </a:schemeClr>
+                </a:solidFill>
+              </a:rPr>
+              <a:t>3000-6000</a:t>
+            </a:r>
+            <a:r>
+              <a:rPr lang="en-IN" dirty="0">
+                <a:solidFill>
+                  <a:schemeClr val="tx1">
+                    <a:lumMod val="95000"/>
+                  </a:schemeClr>
+                </a:solidFill>
+              </a:rPr>
+              <a:t> are having a higher chances of getting Charged Off.</a:t>
+            </a:r>
+          </a:p>
+          <a:p>
+            <a:r>
+              <a:rPr lang="en-IN" b="1" dirty="0">
+                <a:solidFill>
+                  <a:schemeClr val="tx1">
+                    <a:lumMod val="95000"/>
+                  </a:schemeClr>
+                </a:solidFill>
+              </a:rPr>
+              <a:t>Purpose</a:t>
+            </a:r>
+            <a:r>
+              <a:rPr lang="en-IN" dirty="0">
+                <a:solidFill>
+                  <a:schemeClr val="tx1">
+                    <a:lumMod val="95000"/>
+                  </a:schemeClr>
+                </a:solidFill>
+              </a:rPr>
+              <a:t> attribute may be a factor for the loans getting Charged Off.</a:t>
+            </a:r>
+          </a:p>
+          <a:p>
+            <a:r>
+              <a:rPr lang="en-IN" dirty="0">
+                <a:solidFill>
+                  <a:schemeClr val="tx1">
+                    <a:lumMod val="95000"/>
+                  </a:schemeClr>
+                </a:solidFill>
+              </a:rPr>
+              <a:t>People with </a:t>
+            </a:r>
+            <a:r>
+              <a:rPr lang="en-IN" b="1" dirty="0">
+                <a:solidFill>
+                  <a:schemeClr val="tx1">
+                    <a:lumMod val="95000"/>
+                  </a:schemeClr>
+                </a:solidFill>
+              </a:rPr>
+              <a:t>employment 10 or more years</a:t>
+            </a:r>
+            <a:r>
+              <a:rPr lang="en-IN" dirty="0">
+                <a:solidFill>
+                  <a:schemeClr val="tx1">
+                    <a:lumMod val="95000"/>
+                  </a:schemeClr>
+                </a:solidFill>
+              </a:rPr>
+              <a:t> are more likely to be Charged Off.</a:t>
+            </a:r>
+          </a:p>
+          <a:p>
+            <a:r>
+              <a:rPr lang="en-IN" dirty="0">
+                <a:solidFill>
+                  <a:schemeClr val="tx1">
+                    <a:lumMod val="95000"/>
+                  </a:schemeClr>
+                </a:solidFill>
+              </a:rPr>
+              <a:t>Almost </a:t>
+            </a:r>
+            <a:r>
+              <a:rPr lang="en-IN" b="1" dirty="0">
+                <a:solidFill>
+                  <a:schemeClr val="tx1">
+                    <a:lumMod val="95000"/>
+                  </a:schemeClr>
+                </a:solidFill>
+              </a:rPr>
+              <a:t>44%</a:t>
+            </a:r>
+            <a:r>
+              <a:rPr lang="en-IN" dirty="0">
+                <a:solidFill>
+                  <a:schemeClr val="tx1">
+                    <a:lumMod val="95000"/>
+                  </a:schemeClr>
+                </a:solidFill>
+              </a:rPr>
+              <a:t> of the loans are </a:t>
+            </a:r>
+            <a:r>
+              <a:rPr lang="en-IN" b="1" dirty="0">
+                <a:solidFill>
+                  <a:schemeClr val="tx1">
+                    <a:lumMod val="95000"/>
+                  </a:schemeClr>
+                </a:solidFill>
+              </a:rPr>
+              <a:t>not verified</a:t>
+            </a:r>
+            <a:r>
+              <a:rPr lang="en-IN" dirty="0">
+                <a:solidFill>
+                  <a:schemeClr val="tx1">
+                    <a:lumMod val="95000"/>
+                  </a:schemeClr>
+                </a:solidFill>
+              </a:rPr>
+              <a:t>. This could be a reason for the defaulters.</a:t>
+            </a:r>
+          </a:p>
+          <a:p>
+            <a:r>
+              <a:rPr lang="en-IN" dirty="0">
+                <a:solidFill>
+                  <a:schemeClr val="tx1">
+                    <a:lumMod val="95000"/>
+                  </a:schemeClr>
+                </a:solidFill>
+              </a:rPr>
+              <a:t>It is observed of a pattern on the </a:t>
+            </a:r>
+            <a:r>
+              <a:rPr lang="en-IN" b="1" dirty="0">
+                <a:solidFill>
+                  <a:schemeClr val="tx1">
+                    <a:lumMod val="95000"/>
+                  </a:schemeClr>
+                </a:solidFill>
+              </a:rPr>
+              <a:t>Month</a:t>
+            </a:r>
+            <a:r>
+              <a:rPr lang="en-IN" dirty="0">
+                <a:solidFill>
+                  <a:schemeClr val="tx1">
+                    <a:lumMod val="95000"/>
+                  </a:schemeClr>
+                </a:solidFill>
+              </a:rPr>
+              <a:t> of the loan issued. </a:t>
+            </a:r>
+          </a:p>
+          <a:p>
+            <a:r>
+              <a:rPr lang="en-IN" dirty="0">
+                <a:solidFill>
+                  <a:schemeClr val="tx1">
+                    <a:lumMod val="95000"/>
+                  </a:schemeClr>
+                </a:solidFill>
+              </a:rPr>
+              <a:t>Loans issued to the </a:t>
+            </a:r>
+            <a:r>
+              <a:rPr lang="en-IN" b="1" dirty="0">
+                <a:solidFill>
+                  <a:schemeClr val="tx1">
+                    <a:lumMod val="95000"/>
+                  </a:schemeClr>
+                </a:solidFill>
+              </a:rPr>
+              <a:t>State NE</a:t>
+            </a:r>
+            <a:r>
+              <a:rPr lang="en-IN" dirty="0">
+                <a:solidFill>
+                  <a:schemeClr val="tx1">
+                    <a:lumMod val="95000"/>
+                  </a:schemeClr>
+                </a:solidFill>
+              </a:rPr>
+              <a:t> has more % of loans charged off</a:t>
+            </a:r>
+          </a:p>
+          <a:p>
+            <a:r>
+              <a:rPr lang="en-IN" dirty="0">
+                <a:solidFill>
+                  <a:schemeClr val="tx1">
+                    <a:lumMod val="95000"/>
+                  </a:schemeClr>
+                </a:solidFill>
+              </a:rPr>
+              <a:t>Loans issued under the </a:t>
+            </a:r>
+            <a:r>
+              <a:rPr lang="en-IN" b="1" dirty="0">
+                <a:solidFill>
+                  <a:schemeClr val="tx1">
+                    <a:lumMod val="95000"/>
+                  </a:schemeClr>
+                </a:solidFill>
+              </a:rPr>
+              <a:t>Grade – G</a:t>
+            </a:r>
+            <a:r>
+              <a:rPr lang="en-IN" dirty="0">
+                <a:solidFill>
+                  <a:schemeClr val="tx1">
+                    <a:lumMod val="95000"/>
+                  </a:schemeClr>
+                </a:solidFill>
+              </a:rPr>
+              <a:t> are more likely to be charged off.</a:t>
+            </a:r>
+          </a:p>
+          <a:p>
+            <a:r>
+              <a:rPr lang="en-IN" dirty="0">
+                <a:solidFill>
+                  <a:schemeClr val="tx1">
+                    <a:lumMod val="95000"/>
+                  </a:schemeClr>
+                </a:solidFill>
+              </a:rPr>
+              <a:t>Also, the loans issued under </a:t>
+            </a:r>
+            <a:r>
+              <a:rPr lang="en-IN" b="1" dirty="0">
+                <a:solidFill>
+                  <a:schemeClr val="tx1">
+                    <a:lumMod val="95000"/>
+                  </a:schemeClr>
+                </a:solidFill>
+              </a:rPr>
+              <a:t>sub-Grades F5, G2, G2, G3, G5</a:t>
+            </a:r>
+            <a:r>
+              <a:rPr lang="en-IN" dirty="0">
+                <a:solidFill>
+                  <a:schemeClr val="tx1">
+                    <a:lumMod val="95000"/>
+                  </a:schemeClr>
+                </a:solidFill>
+              </a:rPr>
+              <a:t> are prone to be Charged Off.</a:t>
+            </a:r>
+          </a:p>
+          <a:p>
+            <a:r>
+              <a:rPr lang="en-IN" dirty="0">
+                <a:solidFill>
+                  <a:schemeClr val="tx1">
+                    <a:lumMod val="95000"/>
+                  </a:schemeClr>
+                </a:solidFill>
+              </a:rPr>
+              <a:t>Loans issued to home ownership is </a:t>
+            </a:r>
+            <a:r>
+              <a:rPr lang="en-IN" b="1" dirty="0">
+                <a:solidFill>
+                  <a:schemeClr val="tx1">
+                    <a:lumMod val="95000"/>
+                  </a:schemeClr>
+                </a:solidFill>
+              </a:rPr>
+              <a:t>OTHER</a:t>
+            </a:r>
+            <a:r>
+              <a:rPr lang="en-IN" dirty="0">
+                <a:solidFill>
+                  <a:schemeClr val="tx1">
+                    <a:lumMod val="95000"/>
+                  </a:schemeClr>
+                </a:solidFill>
+              </a:rPr>
+              <a:t> tend to have their loans Charged Off more. </a:t>
+            </a:r>
+          </a:p>
+          <a:p>
+            <a:r>
+              <a:rPr lang="en-IN" dirty="0">
+                <a:solidFill>
+                  <a:schemeClr val="tx1">
+                    <a:lumMod val="95000"/>
+                  </a:schemeClr>
+                </a:solidFill>
+              </a:rPr>
+              <a:t>Also, home ownership as </a:t>
+            </a:r>
+            <a:r>
+              <a:rPr lang="en-IN" b="1" dirty="0">
+                <a:solidFill>
+                  <a:schemeClr val="tx1">
+                    <a:lumMod val="95000"/>
+                  </a:schemeClr>
+                </a:solidFill>
+              </a:rPr>
+              <a:t>RENT</a:t>
+            </a:r>
+            <a:r>
+              <a:rPr lang="en-IN" dirty="0">
+                <a:solidFill>
+                  <a:schemeClr val="tx1">
+                    <a:lumMod val="95000"/>
+                  </a:schemeClr>
+                </a:solidFill>
+              </a:rPr>
+              <a:t> tend to take more loans and also Charged off…</a:t>
+            </a:r>
+          </a:p>
+        </p:txBody>
+      </p:sp>
+    </p:spTree>
+    <p:extLst>
+      <p:ext uri="{BB962C8B-B14F-4D97-AF65-F5344CB8AC3E}">
+        <p14:creationId xmlns:p14="http://schemas.microsoft.com/office/powerpoint/2010/main" val="1409506077"/>
       </p:ext>
     </p:extLst>
   </p:cSld>
@@ -9734,7 +12729,7 @@
         <p:spPr>
           <a:xfrm>
             <a:off x="676657" y="2157730"/>
-            <a:ext cx="6638543" cy="3718681"/>
+            <a:ext cx="6638543" cy="4128770"/>
           </a:xfrm>
         </p:spPr>
         <p:txBody>
@@ -9754,7 +12749,34 @@
                   <a:srgbClr val="FFFFFF"/>
                 </a:solidFill>
               </a:rPr>
-              <a:t>Analysing the past lending data, the company wants to understand the driving factors (or driver variables) behind loan default, i.e., the variables which are strong indicators of default.  The company can utilise this knowledge for its portfolio and risk assessment. </a:t>
+              <a:t>Analysing the past lending data, the company wants to understand the driving factors (or driver variables) behind loan default, i.e., the variables which are strong indicators of default.</a:t>
+            </a:r>
+          </a:p>
+          <a:p>
+            <a:pPr algn="just">
+              <a:lnSpc>
+                <a:spcPct val="114000"/>
+              </a:lnSpc>
+            </a:pPr>
+            <a:endParaRPr lang="en-IN" dirty="0">
+              <a:solidFill>
+                <a:srgbClr val="FFFFFF"/>
+              </a:solidFill>
+            </a:endParaRPr>
+          </a:p>
+          <a:p>
+            <a:pPr algn="just">
+              <a:lnSpc>
+                <a:spcPct val="114000"/>
+              </a:lnSpc>
+            </a:pPr>
+            <a:r>
+              <a:rPr lang="en-IN" dirty="0">
+                <a:solidFill>
+                  <a:srgbClr val="FFFFFF"/>
+                </a:solidFill>
+              </a:rPr>
+              <a:t>The company can utilise this knowledge for its portfolio and risk assessment. </a:t>
             </a:r>
             <a:r>
               <a:rPr lang="en-IN" dirty="0" err="1">
@@ -9974,7 +12996,11 @@
                 <a:spcPct val="114000"/>
               </a:lnSpc>
             </a:pPr>
-            <a:endParaRPr lang="en-US" dirty="0"/>
+            <a:endParaRPr lang="en-US" dirty="0">
+              <a:solidFill>
+                <a:schemeClr val="tx1"/>
+              </a:solidFill>
+            </a:endParaRPr>
           </a:p>
           <a:p>
             <a:pPr marL="4572" lvl="1" indent="0">
@@ -9988,7 +13014,7 @@
                   <a:schemeClr val="tx1"/>
                 </a:solidFill>
               </a:rPr>
-              <a:t>Gautham Singh</a:t>
+              <a:t>Gautam Singh</a:t>
             </a:r>
           </a:p>
           <a:p>
@@ -9998,7 +13024,11 @@
               </a:lnSpc>
             </a:pPr>
             <a:r>
-              <a:rPr lang="en-US" dirty="0"/>
+              <a:rPr lang="en-US" dirty="0">
+                <a:solidFill>
+                  <a:schemeClr val="tx1"/>
+                </a:solidFill>
+              </a:rPr>
               <a:t>Back-End Engineer with 5+ years of experience developing and maintaining scalable, high-performance, and secure server-side applications. Experience in various domains like Health, FMCG, Real Estate, and Social Media platforms.</a:t>
             </a:r>
           </a:p>
@@ -10393,7 +13423,7 @@
             <p:ph idx="1"/>
             <p:extLst>
               <p:ext uri="{D42A27DB-BD31-4B8C-83A1-F6EECF244321}">
-                <p14:modId xmlns:p14="http://schemas.microsoft.com/office/powerpoint/2010/main" val="1512070158"/>
+                <p14:modId xmlns:p14="http://schemas.microsoft.com/office/powerpoint/2010/main" val="317829076"/>
               </p:ext>
             </p:extLst>
           </p:nvPr>
@@ -10436,6 +13466,14 @@
 <file path=ppt/slides/slide7.xml><?xml version="1.0" encoding="utf-8"?>
 <p:sld xmlns:a="http://schemas.openxmlformats.org/drawingml/2006/main" xmlns:r="http://schemas.openxmlformats.org/officeDocument/2006/relationships" xmlns:p="http://schemas.openxmlformats.org/presentationml/2006/main">
   <p:cSld>
+    <p:bg>
+      <p:bgPr>
+        <a:solidFill>
+          <a:schemeClr val="bg2"/>
+        </a:solidFill>
+        <a:effectLst/>
+      </p:bgPr>
+    </p:bg>
     <p:spTree>
       <p:nvGrpSpPr>
         <p:cNvPr id="1" name=""/>
@@ -10466,14 +13504,21 @@
             <p:ph type="title"/>
           </p:nvPr>
         </p:nvSpPr>
-        <p:spPr/>
+        <p:spPr>
+          <a:xfrm>
+            <a:off x="657225" y="499533"/>
+            <a:ext cx="9696450" cy="938742"/>
+          </a:xfrm>
+        </p:spPr>
         <p:txBody>
-          <a:bodyPr/>
+          <a:bodyPr>
+            <a:normAutofit/>
+          </a:bodyPr>
           <a:lstStyle/>
           <a:p>
             <a:r>
               <a:rPr lang="en-IN" dirty="0"/>
-              <a:t>Data Cleaning</a:t>
+              <a:t>Data Cleaning – Nulls &amp; NA</a:t>
             </a:r>
           </a:p>
         </p:txBody>
@@ -10494,19 +13539,1118 @@
             <p:ph idx="1"/>
           </p:nvPr>
         </p:nvSpPr>
-        <p:spPr/>
+        <p:spPr>
+          <a:xfrm>
+            <a:off x="676656" y="2011680"/>
+            <a:ext cx="7552943" cy="4579620"/>
+          </a:xfrm>
+        </p:spPr>
         <p:txBody>
-          <a:bodyPr/>
+          <a:bodyPr>
+            <a:normAutofit/>
+          </a:bodyPr>
           <a:lstStyle/>
           <a:p>
-            <a:endParaRPr lang="en-IN" dirty="0"/>
+            <a:pPr marL="361950" lvl="1" indent="-355600" algn="just">
+              <a:lnSpc>
+                <a:spcPct val="114000"/>
+              </a:lnSpc>
+              <a:buClr>
+                <a:schemeClr val="tx1"/>
+              </a:buClr>
+              <a:buFont typeface="Arial" panose="020B0604020202020204" pitchFamily="34" charset="0"/>
+              <a:buChar char="•"/>
+            </a:pPr>
+            <a:r>
+              <a:rPr lang="en-IN" sz="1700" dirty="0">
+                <a:solidFill>
+                  <a:schemeClr val="tx1">
+                    <a:lumMod val="95000"/>
+                  </a:schemeClr>
+                </a:solidFill>
+              </a:rPr>
+              <a:t>Initial Analysis has ~52% of data with Nulls or NA values. </a:t>
+            </a:r>
+          </a:p>
+          <a:p>
+            <a:pPr marL="361950" lvl="1" indent="-355600" algn="just">
+              <a:lnSpc>
+                <a:spcPct val="114000"/>
+              </a:lnSpc>
+              <a:buClr>
+                <a:schemeClr val="tx1"/>
+              </a:buClr>
+              <a:buFont typeface="Arial" panose="020B0604020202020204" pitchFamily="34" charset="0"/>
+              <a:buChar char="•"/>
+            </a:pPr>
+            <a:r>
+              <a:rPr lang="en-IN" sz="1700" dirty="0">
+                <a:solidFill>
+                  <a:schemeClr val="tx1">
+                    <a:lumMod val="95000"/>
+                  </a:schemeClr>
+                </a:solidFill>
+              </a:rPr>
+              <a:t>Upon further Analysis, we observe Most of the Columns have only 1 value (either it be NA/NULL/a valid value). These columns are not useful for analysis. They can be discarded.</a:t>
+            </a:r>
+          </a:p>
+          <a:p>
+            <a:pPr marL="361950" lvl="1" indent="-355600" algn="just">
+              <a:lnSpc>
+                <a:spcPct val="114000"/>
+              </a:lnSpc>
+              <a:buClr>
+                <a:schemeClr val="tx1"/>
+              </a:buClr>
+              <a:buFont typeface="Arial" panose="020B0604020202020204" pitchFamily="34" charset="0"/>
+              <a:buChar char="•"/>
+            </a:pPr>
+            <a:endParaRPr lang="en-IN" sz="1700" dirty="0">
+              <a:solidFill>
+                <a:schemeClr val="tx1">
+                  <a:lumMod val="95000"/>
+                </a:schemeClr>
+              </a:solidFill>
+            </a:endParaRPr>
+          </a:p>
+          <a:p>
+            <a:pPr marL="361950" lvl="1" indent="-355600" algn="just">
+              <a:lnSpc>
+                <a:spcPct val="114000"/>
+              </a:lnSpc>
+              <a:buClr>
+                <a:schemeClr val="tx1"/>
+              </a:buClr>
+              <a:buFont typeface="Arial" panose="020B0604020202020204" pitchFamily="34" charset="0"/>
+              <a:buChar char="•"/>
+            </a:pPr>
+            <a:r>
+              <a:rPr lang="en-IN" sz="1700" dirty="0">
+                <a:solidFill>
+                  <a:schemeClr val="tx1">
+                    <a:lumMod val="95000"/>
+                  </a:schemeClr>
+                </a:solidFill>
+              </a:rPr>
+              <a:t>The columns related to person identification (id, </a:t>
+            </a:r>
+            <a:r>
+              <a:rPr lang="en-IN" sz="1700" dirty="0" err="1">
+                <a:solidFill>
+                  <a:schemeClr val="tx1">
+                    <a:lumMod val="95000"/>
+                  </a:schemeClr>
+                </a:solidFill>
+              </a:rPr>
+              <a:t>member_id</a:t>
+            </a:r>
+            <a:r>
+              <a:rPr lang="en-IN" sz="1700" dirty="0">
+                <a:solidFill>
+                  <a:schemeClr val="tx1">
+                    <a:lumMod val="95000"/>
+                  </a:schemeClr>
+                </a:solidFill>
+              </a:rPr>
+              <a:t>, </a:t>
+            </a:r>
+            <a:r>
+              <a:rPr lang="en-IN" sz="1700" dirty="0" err="1">
+                <a:solidFill>
+                  <a:schemeClr val="tx1">
+                    <a:lumMod val="95000"/>
+                  </a:schemeClr>
+                </a:solidFill>
+              </a:rPr>
+              <a:t>emp_title</a:t>
+            </a:r>
+            <a:r>
+              <a:rPr lang="en-IN" sz="1700" dirty="0">
+                <a:solidFill>
+                  <a:schemeClr val="tx1">
+                    <a:lumMod val="95000"/>
+                  </a:schemeClr>
+                </a:solidFill>
+              </a:rPr>
+              <a:t>, title, </a:t>
+            </a:r>
+            <a:r>
+              <a:rPr lang="en-IN" sz="1700" dirty="0" err="1">
+                <a:solidFill>
+                  <a:schemeClr val="tx1">
+                    <a:lumMod val="95000"/>
+                  </a:schemeClr>
+                </a:solidFill>
+              </a:rPr>
+              <a:t>url</a:t>
+            </a:r>
+            <a:r>
+              <a:rPr lang="en-IN" sz="1700" dirty="0">
+                <a:solidFill>
+                  <a:schemeClr val="tx1">
+                    <a:lumMod val="95000"/>
+                  </a:schemeClr>
+                </a:solidFill>
+              </a:rPr>
+              <a:t>, </a:t>
+            </a:r>
+            <a:r>
+              <a:rPr lang="en-IN" sz="1700" dirty="0" err="1">
+                <a:solidFill>
+                  <a:schemeClr val="tx1">
+                    <a:lumMod val="95000"/>
+                  </a:schemeClr>
+                </a:solidFill>
+              </a:rPr>
+              <a:t>desc</a:t>
+            </a:r>
+            <a:r>
+              <a:rPr lang="en-IN" sz="1700" dirty="0">
+                <a:solidFill>
+                  <a:schemeClr val="tx1">
+                    <a:lumMod val="95000"/>
+                  </a:schemeClr>
+                </a:solidFill>
+              </a:rPr>
+              <a:t>, etc) is assumed that they may not add any relevance to the analysis. Hence, they are discarded.</a:t>
+            </a:r>
+          </a:p>
+          <a:p>
+            <a:pPr marL="361950" lvl="1" indent="-355600" algn="just">
+              <a:lnSpc>
+                <a:spcPct val="114000"/>
+              </a:lnSpc>
+              <a:buClr>
+                <a:schemeClr val="tx1"/>
+              </a:buClr>
+              <a:buFont typeface="Arial" panose="020B0604020202020204" pitchFamily="34" charset="0"/>
+              <a:buChar char="•"/>
+            </a:pPr>
+            <a:r>
+              <a:rPr lang="en-IN" sz="1700" dirty="0">
+                <a:solidFill>
+                  <a:schemeClr val="tx1">
+                    <a:lumMod val="95000"/>
+                  </a:schemeClr>
+                </a:solidFill>
+              </a:rPr>
+              <a:t>Also, some columns related to the current loan information, like last due date etc. are also assumed to be non-relevant as the analysis is not person centric.</a:t>
+            </a:r>
+          </a:p>
+          <a:p>
+            <a:pPr marL="361950" lvl="1" indent="-355600" algn="just">
+              <a:lnSpc>
+                <a:spcPct val="114000"/>
+              </a:lnSpc>
+              <a:buClr>
+                <a:schemeClr val="tx1"/>
+              </a:buClr>
+              <a:buFont typeface="Arial" panose="020B0604020202020204" pitchFamily="34" charset="0"/>
+              <a:buChar char="•"/>
+            </a:pPr>
+            <a:r>
+              <a:rPr lang="en-IN" sz="1700" dirty="0">
+                <a:solidFill>
+                  <a:schemeClr val="tx1">
+                    <a:lumMod val="95000"/>
+                  </a:schemeClr>
+                </a:solidFill>
+              </a:rPr>
+              <a:t>The columns </a:t>
+            </a:r>
+            <a:r>
+              <a:rPr lang="en-IN" sz="1700" dirty="0" err="1">
+                <a:solidFill>
+                  <a:schemeClr val="tx1">
+                    <a:lumMod val="95000"/>
+                  </a:schemeClr>
+                </a:solidFill>
+              </a:rPr>
+              <a:t>pub_rec_bankruptcies</a:t>
+            </a:r>
+            <a:r>
+              <a:rPr lang="en-IN" sz="1700" dirty="0">
+                <a:solidFill>
+                  <a:schemeClr val="tx1">
+                    <a:lumMod val="95000"/>
+                  </a:schemeClr>
+                </a:solidFill>
+              </a:rPr>
+              <a:t>, </a:t>
+            </a:r>
+            <a:r>
+              <a:rPr lang="en-IN" sz="1700" dirty="0" err="1">
+                <a:solidFill>
+                  <a:schemeClr val="tx1">
+                    <a:lumMod val="95000"/>
+                  </a:schemeClr>
+                </a:solidFill>
+              </a:rPr>
+              <a:t>tax_liens</a:t>
+            </a:r>
+            <a:r>
+              <a:rPr lang="en-IN" sz="1700" dirty="0">
+                <a:solidFill>
+                  <a:schemeClr val="tx1">
+                    <a:lumMod val="95000"/>
+                  </a:schemeClr>
+                </a:solidFill>
+              </a:rPr>
+              <a:t> have mostly ~1 non-null information. As we cannot fill in with any information, it is assumed &amp; discarded.</a:t>
+            </a:r>
+          </a:p>
+          <a:p>
+            <a:pPr marL="207518" lvl="2" indent="0" algn="just">
+              <a:lnSpc>
+                <a:spcPct val="114000"/>
+              </a:lnSpc>
+              <a:buClr>
+                <a:schemeClr val="tx1"/>
+              </a:buClr>
+              <a:buNone/>
+            </a:pPr>
+            <a:endParaRPr lang="en-IN" sz="1300" dirty="0">
+              <a:solidFill>
+                <a:schemeClr val="tx1">
+                  <a:lumMod val="95000"/>
+                </a:schemeClr>
+              </a:solidFill>
+            </a:endParaRPr>
           </a:p>
         </p:txBody>
       </p:sp>
+      <p:pic>
+        <p:nvPicPr>
+          <p:cNvPr id="7" name="Graphic 6" descr="Mop and bucket">
+            <a:extLst>
+              <a:ext uri="{FF2B5EF4-FFF2-40B4-BE49-F238E27FC236}">
+                <a16:creationId xmlns:a16="http://schemas.microsoft.com/office/drawing/2014/main" id="{AFDEB4D1-783B-55FC-603A-C7B919DE42ED}"/>
+              </a:ext>
+            </a:extLst>
+          </p:cNvPr>
+          <p:cNvPicPr>
+            <a:picLocks noChangeAspect="1"/>
+          </p:cNvPicPr>
+          <p:nvPr/>
+        </p:nvPicPr>
+        <p:blipFill>
+          <a:blip r:embed="rId2">
+            <a:extLst>
+              <a:ext uri="{28A0092B-C50C-407E-A947-70E740481C1C}">
+                <a14:useLocalDpi xmlns:a14="http://schemas.microsoft.com/office/drawing/2010/main" val="0"/>
+              </a:ext>
+              <a:ext uri="{96DAC541-7B7A-43D3-8B79-37D633B846F1}">
+                <asvg:svgBlip xmlns:asvg="http://schemas.microsoft.com/office/drawing/2016/SVG/main" r:embed="rId3"/>
+              </a:ext>
+            </a:extLst>
+          </a:blip>
+          <a:stretch>
+            <a:fillRect/>
+          </a:stretch>
+        </p:blipFill>
+        <p:spPr>
+          <a:xfrm>
+            <a:off x="8100058" y="1703445"/>
+            <a:ext cx="3448478" cy="3448478"/>
+          </a:xfrm>
+          <a:prstGeom prst="rect">
+            <a:avLst/>
+          </a:prstGeom>
+        </p:spPr>
+      </p:pic>
     </p:spTree>
     <p:extLst>
       <p:ext uri="{BB962C8B-B14F-4D97-AF65-F5344CB8AC3E}">
         <p14:creationId xmlns:p14="http://schemas.microsoft.com/office/powerpoint/2010/main" val="3529232089"/>
+      </p:ext>
+    </p:extLst>
+  </p:cSld>
+  <p:clrMapOvr>
+    <a:masterClrMapping/>
+  </p:clrMapOvr>
+  <mc:AlternateContent xmlns:mc="http://schemas.openxmlformats.org/markup-compatibility/2006" xmlns:p14="http://schemas.microsoft.com/office/powerpoint/2010/main">
+    <mc:Choice Requires="p14">
+      <p:transition spd="med" p14:dur="700">
+        <p:fade/>
+      </p:transition>
+    </mc:Choice>
+    <mc:Fallback xmlns="">
+      <p:transition spd="med">
+        <p:fade/>
+      </p:transition>
+    </mc:Fallback>
+  </mc:AlternateContent>
+</p:sld>
+</file>
+
+<file path=ppt/slides/slide8.xml><?xml version="1.0" encoding="utf-8"?>
+<p:sld xmlns:a="http://schemas.openxmlformats.org/drawingml/2006/main" xmlns:r="http://schemas.openxmlformats.org/officeDocument/2006/relationships" xmlns:p="http://schemas.openxmlformats.org/presentationml/2006/main">
+  <p:cSld>
+    <p:spTree>
+      <p:nvGrpSpPr>
+        <p:cNvPr id="1" name=""/>
+        <p:cNvGrpSpPr/>
+        <p:nvPr/>
+      </p:nvGrpSpPr>
+      <p:grpSpPr>
+        <a:xfrm>
+          <a:off x="0" y="0"/>
+          <a:ext cx="0" cy="0"/>
+          <a:chOff x="0" y="0"/>
+          <a:chExt cx="0" cy="0"/>
+        </a:xfrm>
+      </p:grpSpPr>
+      <p:sp>
+        <p:nvSpPr>
+          <p:cNvPr id="2" name="Title 1">
+            <a:extLst>
+              <a:ext uri="{FF2B5EF4-FFF2-40B4-BE49-F238E27FC236}">
+                <a16:creationId xmlns:a16="http://schemas.microsoft.com/office/drawing/2014/main" id="{0FE951E1-6EF4-CA4C-966A-A4E92C9D6CDE}"/>
+              </a:ext>
+            </a:extLst>
+          </p:cNvPr>
+          <p:cNvSpPr>
+            <a:spLocks noGrp="1"/>
+          </p:cNvSpPr>
+          <p:nvPr>
+            <p:ph type="title"/>
+          </p:nvPr>
+        </p:nvSpPr>
+        <p:spPr>
+          <a:xfrm>
+            <a:off x="657225" y="499533"/>
+            <a:ext cx="10096500" cy="986367"/>
+          </a:xfrm>
+        </p:spPr>
+        <p:txBody>
+          <a:bodyPr>
+            <a:normAutofit/>
+          </a:bodyPr>
+          <a:lstStyle/>
+          <a:p>
+            <a:r>
+              <a:rPr lang="en-IN" dirty="0"/>
+              <a:t>Data Cleaning –Missing Information</a:t>
+            </a:r>
+          </a:p>
+        </p:txBody>
+      </p:sp>
+      <p:sp>
+        <p:nvSpPr>
+          <p:cNvPr id="3" name="Content Placeholder 2">
+            <a:extLst>
+              <a:ext uri="{FF2B5EF4-FFF2-40B4-BE49-F238E27FC236}">
+                <a16:creationId xmlns:a16="http://schemas.microsoft.com/office/drawing/2014/main" id="{29364848-618E-8EF0-CCD6-C54F18029261}"/>
+              </a:ext>
+            </a:extLst>
+          </p:cNvPr>
+          <p:cNvSpPr>
+            <a:spLocks noGrp="1"/>
+          </p:cNvSpPr>
+          <p:nvPr>
+            <p:ph idx="1"/>
+          </p:nvPr>
+        </p:nvSpPr>
+        <p:spPr>
+          <a:xfrm>
+            <a:off x="676656" y="1485900"/>
+            <a:ext cx="7552943" cy="4572000"/>
+          </a:xfrm>
+        </p:spPr>
+        <p:txBody>
+          <a:bodyPr>
+            <a:normAutofit/>
+          </a:bodyPr>
+          <a:lstStyle/>
+          <a:p>
+            <a:pPr marL="361950" lvl="1" indent="-355600" algn="just">
+              <a:lnSpc>
+                <a:spcPct val="114000"/>
+              </a:lnSpc>
+              <a:buClr>
+                <a:schemeClr val="tx1"/>
+              </a:buClr>
+              <a:buFont typeface="Arial" panose="020B0604020202020204" pitchFamily="34" charset="0"/>
+              <a:buChar char="•"/>
+            </a:pPr>
+            <a:r>
+              <a:rPr lang="en-IN" sz="2000" dirty="0">
+                <a:solidFill>
+                  <a:schemeClr val="tx1">
+                    <a:lumMod val="95000"/>
+                  </a:schemeClr>
+                </a:solidFill>
+              </a:rPr>
+              <a:t>Following columns have missing information. </a:t>
+            </a:r>
+          </a:p>
+          <a:p>
+            <a:pPr marL="361950" lvl="1" indent="-355600" algn="just">
+              <a:lnSpc>
+                <a:spcPct val="114000"/>
+              </a:lnSpc>
+              <a:buClr>
+                <a:schemeClr val="tx1"/>
+              </a:buClr>
+              <a:buFont typeface="Arial" panose="020B0604020202020204" pitchFamily="34" charset="0"/>
+              <a:buChar char="•"/>
+            </a:pPr>
+            <a:endParaRPr lang="en-IN" sz="2000" dirty="0">
+              <a:solidFill>
+                <a:schemeClr val="tx1">
+                  <a:lumMod val="95000"/>
+                </a:schemeClr>
+              </a:solidFill>
+            </a:endParaRPr>
+          </a:p>
+          <a:p>
+            <a:pPr marL="361950" lvl="1" indent="-355600" algn="just">
+              <a:lnSpc>
+                <a:spcPct val="114000"/>
+              </a:lnSpc>
+              <a:buClr>
+                <a:schemeClr val="tx1"/>
+              </a:buClr>
+              <a:buFont typeface="Arial" panose="020B0604020202020204" pitchFamily="34" charset="0"/>
+              <a:buChar char="•"/>
+            </a:pPr>
+            <a:r>
+              <a:rPr lang="en-IN" sz="2000" dirty="0">
+                <a:solidFill>
+                  <a:schemeClr val="tx1">
+                    <a:lumMod val="95000"/>
+                  </a:schemeClr>
+                </a:solidFill>
+              </a:rPr>
+              <a:t>The Column </a:t>
+            </a:r>
+            <a:r>
+              <a:rPr lang="en-IN" sz="2000" b="1" dirty="0" err="1">
+                <a:solidFill>
+                  <a:schemeClr val="tx1">
+                    <a:lumMod val="95000"/>
+                  </a:schemeClr>
+                </a:solidFill>
+              </a:rPr>
+              <a:t>funded_amnt_inv</a:t>
+            </a:r>
+            <a:endParaRPr lang="en-IN" sz="2000" b="1" dirty="0">
+              <a:solidFill>
+                <a:schemeClr val="tx1">
+                  <a:lumMod val="95000"/>
+                </a:schemeClr>
+              </a:solidFill>
+            </a:endParaRPr>
+          </a:p>
+          <a:p>
+            <a:pPr marL="563118" lvl="2" indent="-355600" algn="just">
+              <a:lnSpc>
+                <a:spcPct val="114000"/>
+              </a:lnSpc>
+              <a:buClr>
+                <a:schemeClr val="tx1"/>
+              </a:buClr>
+              <a:buFont typeface="Arial" panose="020B0604020202020204" pitchFamily="34" charset="0"/>
+              <a:buChar char="•"/>
+            </a:pPr>
+            <a:r>
+              <a:rPr lang="en-IN" sz="1600" dirty="0">
+                <a:solidFill>
+                  <a:schemeClr val="tx1">
+                    <a:lumMod val="95000"/>
+                  </a:schemeClr>
+                </a:solidFill>
+              </a:rPr>
+              <a:t>which represents the loan amount funded by the investor has some values=0; which doesn’t make sense. Also those records cannot be sampled/assumed. Hence, its better to discard them.</a:t>
+            </a:r>
+          </a:p>
+          <a:p>
+            <a:pPr marL="207518" lvl="2" indent="0" algn="just">
+              <a:lnSpc>
+                <a:spcPct val="114000"/>
+              </a:lnSpc>
+              <a:buClr>
+                <a:schemeClr val="tx1"/>
+              </a:buClr>
+              <a:buNone/>
+            </a:pPr>
+            <a:endParaRPr lang="en-IN" sz="1600" dirty="0">
+              <a:solidFill>
+                <a:schemeClr val="tx1">
+                  <a:lumMod val="95000"/>
+                </a:schemeClr>
+              </a:solidFill>
+            </a:endParaRPr>
+          </a:p>
+          <a:p>
+            <a:pPr marL="361950" lvl="1" indent="-355600" algn="just">
+              <a:lnSpc>
+                <a:spcPct val="114000"/>
+              </a:lnSpc>
+              <a:buClr>
+                <a:schemeClr val="tx1"/>
+              </a:buClr>
+              <a:buFont typeface="Arial" panose="020B0604020202020204" pitchFamily="34" charset="0"/>
+              <a:buChar char="•"/>
+            </a:pPr>
+            <a:r>
+              <a:rPr lang="en-IN" sz="2000" dirty="0">
+                <a:solidFill>
+                  <a:schemeClr val="tx1">
+                    <a:lumMod val="95000"/>
+                  </a:schemeClr>
+                </a:solidFill>
+              </a:rPr>
+              <a:t>The Column </a:t>
+            </a:r>
+            <a:r>
+              <a:rPr lang="en-IN" sz="2000" b="1" dirty="0" err="1">
+                <a:solidFill>
+                  <a:schemeClr val="tx1">
+                    <a:lumMod val="95000"/>
+                  </a:schemeClr>
+                </a:solidFill>
+              </a:rPr>
+              <a:t>emp_length</a:t>
+            </a:r>
+            <a:endParaRPr lang="en-IN" sz="2000" b="1" dirty="0">
+              <a:solidFill>
+                <a:schemeClr val="tx1">
+                  <a:lumMod val="95000"/>
+                </a:schemeClr>
+              </a:solidFill>
+            </a:endParaRPr>
+          </a:p>
+          <a:p>
+            <a:pPr marL="563118" lvl="2" indent="-355600" algn="just">
+              <a:lnSpc>
+                <a:spcPct val="114000"/>
+              </a:lnSpc>
+              <a:buClr>
+                <a:schemeClr val="tx1"/>
+              </a:buClr>
+              <a:buFont typeface="Arial" panose="020B0604020202020204" pitchFamily="34" charset="0"/>
+              <a:buChar char="•"/>
+            </a:pPr>
+            <a:r>
+              <a:rPr lang="en-IN" sz="1600" dirty="0">
+                <a:solidFill>
+                  <a:schemeClr val="tx1">
+                    <a:lumMod val="95000"/>
+                  </a:schemeClr>
+                </a:solidFill>
+              </a:rPr>
+              <a:t>which represents the employment tenure has some missing information. We can take the most frequently observed value in the </a:t>
+            </a:r>
+            <a:r>
+              <a:rPr lang="en-IN" sz="1600" dirty="0" err="1">
+                <a:solidFill>
+                  <a:schemeClr val="tx1">
+                    <a:lumMod val="95000"/>
+                  </a:schemeClr>
+                </a:solidFill>
+              </a:rPr>
+              <a:t>emp_length</a:t>
+            </a:r>
+            <a:r>
+              <a:rPr lang="en-IN" sz="1600" dirty="0">
+                <a:solidFill>
+                  <a:schemeClr val="tx1">
+                    <a:lumMod val="95000"/>
+                  </a:schemeClr>
+                </a:solidFill>
+              </a:rPr>
+              <a:t> column (mode) and applying there.  (The column </a:t>
+            </a:r>
+            <a:r>
+              <a:rPr lang="en-IN" sz="1600" dirty="0" err="1">
+                <a:solidFill>
+                  <a:schemeClr val="tx1">
+                    <a:lumMod val="95000"/>
+                  </a:schemeClr>
+                </a:solidFill>
+              </a:rPr>
+              <a:t>emp_length</a:t>
+            </a:r>
+            <a:r>
+              <a:rPr lang="en-IN" sz="1600" dirty="0">
+                <a:solidFill>
+                  <a:schemeClr val="tx1">
+                    <a:lumMod val="95000"/>
+                  </a:schemeClr>
+                </a:solidFill>
+              </a:rPr>
+              <a:t> is a categorical column. Hence, considering the most occurred value).</a:t>
+            </a:r>
+          </a:p>
+        </p:txBody>
+      </p:sp>
+      <p:pic>
+        <p:nvPicPr>
+          <p:cNvPr id="7" name="Graphic 6" descr="Mop and bucket">
+            <a:extLst>
+              <a:ext uri="{FF2B5EF4-FFF2-40B4-BE49-F238E27FC236}">
+                <a16:creationId xmlns:a16="http://schemas.microsoft.com/office/drawing/2014/main" id="{AFDEB4D1-783B-55FC-603A-C7B919DE42ED}"/>
+              </a:ext>
+            </a:extLst>
+          </p:cNvPr>
+          <p:cNvPicPr>
+            <a:picLocks noChangeAspect="1"/>
+          </p:cNvPicPr>
+          <p:nvPr/>
+        </p:nvPicPr>
+        <p:blipFill>
+          <a:blip r:embed="rId2">
+            <a:extLst>
+              <a:ext uri="{28A0092B-C50C-407E-A947-70E740481C1C}">
+                <a14:useLocalDpi xmlns:a14="http://schemas.microsoft.com/office/drawing/2010/main" val="0"/>
+              </a:ext>
+              <a:ext uri="{96DAC541-7B7A-43D3-8B79-37D633B846F1}">
+                <asvg:svgBlip xmlns:asvg="http://schemas.microsoft.com/office/drawing/2016/SVG/main" r:embed="rId3"/>
+              </a:ext>
+            </a:extLst>
+          </a:blip>
+          <a:stretch>
+            <a:fillRect/>
+          </a:stretch>
+        </p:blipFill>
+        <p:spPr>
+          <a:xfrm>
+            <a:off x="8100058" y="1703445"/>
+            <a:ext cx="3448478" cy="3448478"/>
+          </a:xfrm>
+          <a:prstGeom prst="rect">
+            <a:avLst/>
+          </a:prstGeom>
+        </p:spPr>
+      </p:pic>
+    </p:spTree>
+    <p:extLst>
+      <p:ext uri="{BB962C8B-B14F-4D97-AF65-F5344CB8AC3E}">
+        <p14:creationId xmlns:p14="http://schemas.microsoft.com/office/powerpoint/2010/main" val="2285208201"/>
+      </p:ext>
+    </p:extLst>
+  </p:cSld>
+  <p:clrMapOvr>
+    <a:masterClrMapping/>
+  </p:clrMapOvr>
+  <mc:AlternateContent xmlns:mc="http://schemas.openxmlformats.org/markup-compatibility/2006" xmlns:p14="http://schemas.microsoft.com/office/powerpoint/2010/main">
+    <mc:Choice Requires="p14">
+      <p:transition spd="med" p14:dur="700">
+        <p:fade/>
+      </p:transition>
+    </mc:Choice>
+    <mc:Fallback xmlns="">
+      <p:transition spd="med">
+        <p:fade/>
+      </p:transition>
+    </mc:Fallback>
+  </mc:AlternateContent>
+</p:sld>
+</file>
+
+<file path=ppt/slides/slide9.xml><?xml version="1.0" encoding="utf-8"?>
+<p:sld xmlns:a="http://schemas.openxmlformats.org/drawingml/2006/main" xmlns:r="http://schemas.openxmlformats.org/officeDocument/2006/relationships" xmlns:p="http://schemas.openxmlformats.org/presentationml/2006/main">
+  <p:cSld>
+    <p:spTree>
+      <p:nvGrpSpPr>
+        <p:cNvPr id="1" name=""/>
+        <p:cNvGrpSpPr/>
+        <p:nvPr/>
+      </p:nvGrpSpPr>
+      <p:grpSpPr>
+        <a:xfrm>
+          <a:off x="0" y="0"/>
+          <a:ext cx="0" cy="0"/>
+          <a:chOff x="0" y="0"/>
+          <a:chExt cx="0" cy="0"/>
+        </a:xfrm>
+      </p:grpSpPr>
+      <p:sp>
+        <p:nvSpPr>
+          <p:cNvPr id="2" name="Title 1">
+            <a:extLst>
+              <a:ext uri="{FF2B5EF4-FFF2-40B4-BE49-F238E27FC236}">
+                <a16:creationId xmlns:a16="http://schemas.microsoft.com/office/drawing/2014/main" id="{0FE951E1-6EF4-CA4C-966A-A4E92C9D6CDE}"/>
+              </a:ext>
+            </a:extLst>
+          </p:cNvPr>
+          <p:cNvSpPr>
+            <a:spLocks noGrp="1"/>
+          </p:cNvSpPr>
+          <p:nvPr>
+            <p:ph type="title"/>
+          </p:nvPr>
+        </p:nvSpPr>
+        <p:spPr>
+          <a:xfrm>
+            <a:off x="657225" y="499533"/>
+            <a:ext cx="10096500" cy="986367"/>
+          </a:xfrm>
+        </p:spPr>
+        <p:txBody>
+          <a:bodyPr>
+            <a:normAutofit/>
+          </a:bodyPr>
+          <a:lstStyle/>
+          <a:p>
+            <a:r>
+              <a:rPr lang="en-IN" dirty="0"/>
+              <a:t>Data Conversions &amp; Extraction</a:t>
+            </a:r>
+          </a:p>
+        </p:txBody>
+      </p:sp>
+      <p:sp>
+        <p:nvSpPr>
+          <p:cNvPr id="3" name="Content Placeholder 2">
+            <a:extLst>
+              <a:ext uri="{FF2B5EF4-FFF2-40B4-BE49-F238E27FC236}">
+                <a16:creationId xmlns:a16="http://schemas.microsoft.com/office/drawing/2014/main" id="{29364848-618E-8EF0-CCD6-C54F18029261}"/>
+              </a:ext>
+            </a:extLst>
+          </p:cNvPr>
+          <p:cNvSpPr>
+            <a:spLocks noGrp="1"/>
+          </p:cNvSpPr>
+          <p:nvPr>
+            <p:ph idx="1"/>
+          </p:nvPr>
+        </p:nvSpPr>
+        <p:spPr>
+          <a:xfrm>
+            <a:off x="676656" y="1485900"/>
+            <a:ext cx="7552943" cy="4572000"/>
+          </a:xfrm>
+        </p:spPr>
+        <p:txBody>
+          <a:bodyPr>
+            <a:normAutofit/>
+          </a:bodyPr>
+          <a:lstStyle/>
+          <a:p>
+            <a:pPr marL="361950" lvl="1" indent="-355600" algn="just">
+              <a:lnSpc>
+                <a:spcPct val="114000"/>
+              </a:lnSpc>
+              <a:buClr>
+                <a:schemeClr val="tx1"/>
+              </a:buClr>
+              <a:buFont typeface="Arial" panose="020B0604020202020204" pitchFamily="34" charset="0"/>
+              <a:buChar char="•"/>
+            </a:pPr>
+            <a:r>
+              <a:rPr lang="en-IN" sz="2000" dirty="0">
+                <a:solidFill>
+                  <a:schemeClr val="tx1">
+                    <a:lumMod val="95000"/>
+                  </a:schemeClr>
+                </a:solidFill>
+              </a:rPr>
+              <a:t>Following columns require data conversions. </a:t>
+            </a:r>
+          </a:p>
+          <a:p>
+            <a:pPr marL="361950" lvl="1" indent="-355600" algn="just">
+              <a:lnSpc>
+                <a:spcPct val="114000"/>
+              </a:lnSpc>
+              <a:buClr>
+                <a:schemeClr val="tx1"/>
+              </a:buClr>
+              <a:buFont typeface="Arial" panose="020B0604020202020204" pitchFamily="34" charset="0"/>
+              <a:buChar char="•"/>
+            </a:pPr>
+            <a:r>
+              <a:rPr lang="en-IN" sz="2000" dirty="0">
+                <a:solidFill>
+                  <a:schemeClr val="tx1">
+                    <a:lumMod val="95000"/>
+                  </a:schemeClr>
+                </a:solidFill>
+              </a:rPr>
+              <a:t>The Column </a:t>
+            </a:r>
+            <a:r>
+              <a:rPr lang="en-IN" sz="2000" b="1" dirty="0" err="1">
+                <a:solidFill>
+                  <a:schemeClr val="tx1">
+                    <a:lumMod val="95000"/>
+                  </a:schemeClr>
+                </a:solidFill>
+              </a:rPr>
+              <a:t>issue_d</a:t>
+            </a:r>
+            <a:endParaRPr lang="en-IN" sz="2000" b="1" dirty="0">
+              <a:solidFill>
+                <a:schemeClr val="tx1">
+                  <a:lumMod val="95000"/>
+                </a:schemeClr>
+              </a:solidFill>
+            </a:endParaRPr>
+          </a:p>
+          <a:p>
+            <a:pPr marL="563118" lvl="2" indent="-355600" algn="just">
+              <a:lnSpc>
+                <a:spcPct val="114000"/>
+              </a:lnSpc>
+              <a:buClr>
+                <a:schemeClr val="tx1"/>
+              </a:buClr>
+              <a:buFont typeface="Arial" panose="020B0604020202020204" pitchFamily="34" charset="0"/>
+              <a:buChar char="•"/>
+            </a:pPr>
+            <a:r>
+              <a:rPr lang="en-IN" sz="1600" dirty="0">
+                <a:solidFill>
+                  <a:schemeClr val="tx1">
+                    <a:lumMod val="95000"/>
+                  </a:schemeClr>
+                </a:solidFill>
+              </a:rPr>
+              <a:t>represents the loan issued date is identified as a string data. The values are converted to python date time. The Month and Year information is extracted.</a:t>
+            </a:r>
+          </a:p>
+          <a:p>
+            <a:pPr marL="361950" lvl="1" indent="-355600" algn="just">
+              <a:lnSpc>
+                <a:spcPct val="114000"/>
+              </a:lnSpc>
+              <a:buClr>
+                <a:schemeClr val="tx1"/>
+              </a:buClr>
+              <a:buFont typeface="Arial" panose="020B0604020202020204" pitchFamily="34" charset="0"/>
+              <a:buChar char="•"/>
+            </a:pPr>
+            <a:r>
+              <a:rPr lang="en-IN" sz="2000" dirty="0">
+                <a:solidFill>
+                  <a:schemeClr val="tx1">
+                    <a:lumMod val="95000"/>
+                  </a:schemeClr>
+                </a:solidFill>
+              </a:rPr>
+              <a:t>The Column </a:t>
+            </a:r>
+            <a:r>
+              <a:rPr lang="en-IN" sz="2000" b="1" dirty="0" err="1">
+                <a:solidFill>
+                  <a:schemeClr val="tx1">
+                    <a:lumMod val="95000"/>
+                  </a:schemeClr>
+                </a:solidFill>
+              </a:rPr>
+              <a:t>int_rate</a:t>
+            </a:r>
+            <a:endParaRPr lang="en-IN" sz="2000" b="1" dirty="0">
+              <a:solidFill>
+                <a:schemeClr val="tx1">
+                  <a:lumMod val="95000"/>
+                </a:schemeClr>
+              </a:solidFill>
+            </a:endParaRPr>
+          </a:p>
+          <a:p>
+            <a:pPr marL="563118" lvl="2" indent="-355600" algn="just">
+              <a:lnSpc>
+                <a:spcPct val="114000"/>
+              </a:lnSpc>
+              <a:buClr>
+                <a:schemeClr val="tx1"/>
+              </a:buClr>
+              <a:buFont typeface="Arial" panose="020B0604020202020204" pitchFamily="34" charset="0"/>
+              <a:buChar char="•"/>
+            </a:pPr>
+            <a:r>
+              <a:rPr lang="en-IN" sz="1600" dirty="0">
+                <a:solidFill>
+                  <a:schemeClr val="tx1">
+                    <a:lumMod val="95000"/>
+                  </a:schemeClr>
+                </a:solidFill>
+              </a:rPr>
+              <a:t>which represents the loan interest rate. It has % postfixed for every value.</a:t>
+            </a:r>
+          </a:p>
+          <a:p>
+            <a:pPr marL="361950" lvl="1" indent="-355600" algn="just">
+              <a:lnSpc>
+                <a:spcPct val="114000"/>
+              </a:lnSpc>
+              <a:buClr>
+                <a:schemeClr val="tx1"/>
+              </a:buClr>
+              <a:buFont typeface="Arial" panose="020B0604020202020204" pitchFamily="34" charset="0"/>
+              <a:buChar char="•"/>
+            </a:pPr>
+            <a:r>
+              <a:rPr lang="en-IN" sz="2000" dirty="0">
+                <a:solidFill>
+                  <a:schemeClr val="tx1">
+                    <a:lumMod val="95000"/>
+                  </a:schemeClr>
+                </a:solidFill>
+              </a:rPr>
+              <a:t>The Column </a:t>
+            </a:r>
+            <a:r>
+              <a:rPr lang="en-IN" sz="2000" b="1" dirty="0">
+                <a:solidFill>
+                  <a:schemeClr val="tx1">
+                    <a:lumMod val="95000"/>
+                  </a:schemeClr>
+                </a:solidFill>
+              </a:rPr>
+              <a:t>term</a:t>
+            </a:r>
+          </a:p>
+          <a:p>
+            <a:pPr marL="563118" lvl="2" indent="-355600" algn="just">
+              <a:lnSpc>
+                <a:spcPct val="114000"/>
+              </a:lnSpc>
+              <a:buClr>
+                <a:schemeClr val="tx1"/>
+              </a:buClr>
+              <a:buFont typeface="Arial" panose="020B0604020202020204" pitchFamily="34" charset="0"/>
+              <a:buChar char="•"/>
+            </a:pPr>
+            <a:r>
+              <a:rPr lang="en-IN" sz="1600" dirty="0">
+                <a:solidFill>
+                  <a:schemeClr val="tx1">
+                    <a:lumMod val="95000"/>
+                  </a:schemeClr>
+                </a:solidFill>
+              </a:rPr>
+              <a:t>which represents the loan term in months. It has months postfixed for every value which is removed.</a:t>
+            </a:r>
+          </a:p>
+          <a:p>
+            <a:pPr marL="361950" lvl="1" indent="-355600" algn="just">
+              <a:lnSpc>
+                <a:spcPct val="114000"/>
+              </a:lnSpc>
+              <a:buClr>
+                <a:schemeClr val="tx1"/>
+              </a:buClr>
+              <a:buFont typeface="Arial" panose="020B0604020202020204" pitchFamily="34" charset="0"/>
+              <a:buChar char="•"/>
+            </a:pPr>
+            <a:r>
+              <a:rPr lang="en-IN" sz="2000" dirty="0">
+                <a:solidFill>
+                  <a:schemeClr val="tx1">
+                    <a:lumMod val="95000"/>
+                  </a:schemeClr>
+                </a:solidFill>
+              </a:rPr>
+              <a:t>The Column </a:t>
+            </a:r>
+            <a:r>
+              <a:rPr lang="en-IN" sz="2000" b="1" dirty="0" err="1">
+                <a:solidFill>
+                  <a:schemeClr val="tx1">
+                    <a:lumMod val="95000"/>
+                  </a:schemeClr>
+                </a:solidFill>
+              </a:rPr>
+              <a:t>emp_length</a:t>
+            </a:r>
+            <a:endParaRPr lang="en-IN" sz="2000" b="1" dirty="0">
+              <a:solidFill>
+                <a:schemeClr val="tx1">
+                  <a:lumMod val="95000"/>
+                </a:schemeClr>
+              </a:solidFill>
+            </a:endParaRPr>
+          </a:p>
+          <a:p>
+            <a:pPr marL="563118" lvl="2" indent="-355600" algn="just">
+              <a:lnSpc>
+                <a:spcPct val="114000"/>
+              </a:lnSpc>
+              <a:buClr>
+                <a:schemeClr val="tx1"/>
+              </a:buClr>
+              <a:buFont typeface="Arial" panose="020B0604020202020204" pitchFamily="34" charset="0"/>
+              <a:buChar char="•"/>
+            </a:pPr>
+            <a:r>
+              <a:rPr lang="en-IN" sz="1600" dirty="0">
+                <a:solidFill>
+                  <a:schemeClr val="tx1">
+                    <a:lumMod val="95000"/>
+                  </a:schemeClr>
+                </a:solidFill>
+              </a:rPr>
+              <a:t>which represents the employment tenure in years. It has year/years postfixed for every value which is removed.</a:t>
+            </a:r>
+          </a:p>
+          <a:p>
+            <a:pPr marL="361950" lvl="1" indent="-355600" algn="just">
+              <a:lnSpc>
+                <a:spcPct val="114000"/>
+              </a:lnSpc>
+              <a:buClr>
+                <a:schemeClr val="tx1"/>
+              </a:buClr>
+              <a:buFont typeface="Arial" panose="020B0604020202020204" pitchFamily="34" charset="0"/>
+              <a:buChar char="•"/>
+            </a:pPr>
+            <a:endParaRPr lang="en-IN" sz="2000" dirty="0">
+              <a:solidFill>
+                <a:schemeClr val="tx1">
+                  <a:lumMod val="95000"/>
+                </a:schemeClr>
+              </a:solidFill>
+            </a:endParaRPr>
+          </a:p>
+        </p:txBody>
+      </p:sp>
+      <p:pic>
+        <p:nvPicPr>
+          <p:cNvPr id="7" name="Graphic 6" descr="Mop and bucket">
+            <a:extLst>
+              <a:ext uri="{FF2B5EF4-FFF2-40B4-BE49-F238E27FC236}">
+                <a16:creationId xmlns:a16="http://schemas.microsoft.com/office/drawing/2014/main" id="{AFDEB4D1-783B-55FC-603A-C7B919DE42ED}"/>
+              </a:ext>
+            </a:extLst>
+          </p:cNvPr>
+          <p:cNvPicPr>
+            <a:picLocks noChangeAspect="1"/>
+          </p:cNvPicPr>
+          <p:nvPr/>
+        </p:nvPicPr>
+        <p:blipFill>
+          <a:blip r:embed="rId2">
+            <a:extLst>
+              <a:ext uri="{28A0092B-C50C-407E-A947-70E740481C1C}">
+                <a14:useLocalDpi xmlns:a14="http://schemas.microsoft.com/office/drawing/2010/main" val="0"/>
+              </a:ext>
+              <a:ext uri="{96DAC541-7B7A-43D3-8B79-37D633B846F1}">
+                <asvg:svgBlip xmlns:asvg="http://schemas.microsoft.com/office/drawing/2016/SVG/main" r:embed="rId3"/>
+              </a:ext>
+            </a:extLst>
+          </a:blip>
+          <a:stretch>
+            <a:fillRect/>
+          </a:stretch>
+        </p:blipFill>
+        <p:spPr>
+          <a:xfrm>
+            <a:off x="8100058" y="1703445"/>
+            <a:ext cx="3448478" cy="3448478"/>
+          </a:xfrm>
+          <a:prstGeom prst="rect">
+            <a:avLst/>
+          </a:prstGeom>
+        </p:spPr>
+      </p:pic>
+    </p:spTree>
+    <p:extLst>
+      <p:ext uri="{BB962C8B-B14F-4D97-AF65-F5344CB8AC3E}">
+        <p14:creationId xmlns:p14="http://schemas.microsoft.com/office/powerpoint/2010/main" val="1741927854"/>
       </p:ext>
     </p:extLst>
   </p:cSld>

</xml_diff>

<commit_message>
Generated PDF of the Presentation
</commit_message>
<xml_diff>
--- a/Lending Club Case Study.pptx
+++ b/Lending Club Case Study.pptx
@@ -11964,9 +11964,7 @@
             <a:r>
               <a:rPr lang="en-IN" sz="2000" dirty="0">
                 <a:solidFill>
-                  <a:schemeClr val="tx1">
-                    <a:lumMod val="95000"/>
-                  </a:schemeClr>
+                  <a:schemeClr val="tx1"/>
                 </a:solidFill>
               </a:rPr>
               <a:t>More loans are given to the people who have </a:t>
@@ -11974,9 +11972,7 @@
             <a:r>
               <a:rPr lang="en-IN" sz="2000" b="1" dirty="0">
                 <a:solidFill>
-                  <a:schemeClr val="tx1">
-                    <a:lumMod val="95000"/>
-                  </a:schemeClr>
+                  <a:schemeClr val="tx1"/>
                 </a:solidFill>
               </a:rPr>
               <a:t>home Ownership – Rent</a:t>
@@ -11984,9 +11980,7 @@
             <a:r>
               <a:rPr lang="en-IN" sz="2000" dirty="0">
                 <a:solidFill>
-                  <a:schemeClr val="tx1">
-                    <a:lumMod val="95000"/>
-                  </a:schemeClr>
+                  <a:schemeClr val="tx1"/>
                 </a:solidFill>
               </a:rPr>
               <a:t> and are also charged off more.</a:t>
@@ -12001,9 +11995,7 @@
             <a:r>
               <a:rPr lang="en-IN" sz="2000" dirty="0">
                 <a:solidFill>
-                  <a:schemeClr val="tx1">
-                    <a:lumMod val="95000"/>
-                  </a:schemeClr>
+                  <a:schemeClr val="tx1"/>
                 </a:solidFill>
               </a:rPr>
               <a:t>On Further analysis, the loans with </a:t>
@@ -12011,9 +12003,7 @@
             <a:r>
               <a:rPr lang="en-IN" sz="2000" b="1" dirty="0">
                 <a:solidFill>
-                  <a:schemeClr val="tx1">
-                    <a:lumMod val="95000"/>
-                  </a:schemeClr>
+                  <a:schemeClr val="tx1"/>
                 </a:solidFill>
               </a:rPr>
               <a:t>home_ownership</a:t>
@@ -12021,9 +12011,7 @@
             <a:r>
               <a:rPr lang="en-IN" sz="2000" dirty="0">
                 <a:solidFill>
-                  <a:schemeClr val="tx1">
-                    <a:lumMod val="95000"/>
-                  </a:schemeClr>
+                  <a:schemeClr val="tx1"/>
                 </a:solidFill>
               </a:rPr>
               <a:t> mentioned as OTHER have a higher rate of Charged Off.</a:t>
@@ -12240,9 +12228,7 @@
             <a:r>
               <a:rPr lang="en-IN" sz="2000" dirty="0">
                 <a:solidFill>
-                  <a:schemeClr val="tx1">
-                    <a:lumMod val="95000"/>
-                  </a:schemeClr>
+                  <a:schemeClr val="tx1"/>
                 </a:solidFill>
               </a:rPr>
               <a:t>60 months tenured loans show a higher Charged Off %.</a:t>
@@ -12257,9 +12243,7 @@
             <a:r>
               <a:rPr lang="en-IN" sz="2000" dirty="0">
                 <a:solidFill>
-                  <a:schemeClr val="tx1">
-                    <a:lumMod val="95000"/>
-                  </a:schemeClr>
+                  <a:schemeClr val="tx1"/>
                 </a:solidFill>
               </a:rPr>
               <a:t>Avoid higher tenured loans.</a:t>
@@ -12426,7 +12410,11 @@
               </a:lnSpc>
             </a:pPr>
             <a:r>
-              <a:rPr lang="en-IN" dirty="0"/>
+              <a:rPr lang="en-IN" dirty="0">
+                <a:solidFill>
+                  <a:schemeClr val="tx1"/>
+                </a:solidFill>
+              </a:rPr>
               <a:t>On Analysis, the Loans are getting Charged off for Higher Interest Rates.</a:t>
             </a:r>
           </a:p>
@@ -12437,7 +12425,11 @@
               </a:lnSpc>
             </a:pPr>
             <a:r>
-              <a:rPr lang="en-IN" dirty="0"/>
+              <a:rPr lang="en-IN" dirty="0">
+                <a:solidFill>
+                  <a:schemeClr val="tx1"/>
+                </a:solidFill>
+              </a:rPr>
               <a:t>Higher grades also mean higher interest rates.</a:t>
             </a:r>
           </a:p>
@@ -12535,36 +12527,6 @@
               </a14:hiddenFill>
             </a:ext>
           </a:extLst>
-        </p:spPr>
-      </p:pic>
-      <p:pic>
-        <p:nvPicPr>
-          <p:cNvPr id="6" name="Picture 5">
-            <a:extLst>
-              <a:ext uri="{FF2B5EF4-FFF2-40B4-BE49-F238E27FC236}">
-                <a16:creationId xmlns:a16="http://schemas.microsoft.com/office/drawing/2014/main" id="{F8EEB1C4-6BD7-EB10-FEA8-6CDDDED0C2D5}"/>
-              </a:ext>
-            </a:extLst>
-          </p:cNvPr>
-          <p:cNvPicPr>
-            <a:picLocks noChangeAspect="1"/>
-          </p:cNvPicPr>
-          <p:nvPr/>
-        </p:nvPicPr>
-        <p:blipFill>
-          <a:blip r:embed="rId4"/>
-          <a:stretch>
-            <a:fillRect/>
-          </a:stretch>
-        </p:blipFill>
-        <p:spPr>
-          <a:xfrm>
-            <a:off x="270649" y="142416"/>
-            <a:ext cx="11650701" cy="6573167"/>
-          </a:xfrm>
-          <a:prstGeom prst="rect">
-            <a:avLst/>
-          </a:prstGeom>
         </p:spPr>
       </p:pic>
     </p:spTree>
@@ -17980,16 +17942,19 @@
         <p:spPr>
           <a:xfrm>
             <a:off x="4702556" y="2011680"/>
-            <a:ext cx="6713303" cy="4247718"/>
+            <a:ext cx="7080949" cy="4549376"/>
           </a:xfrm>
         </p:spPr>
         <p:txBody>
           <a:bodyPr>
-            <a:normAutofit/>
+            <a:normAutofit fontScale="92500" lnSpcReduction="10000"/>
           </a:bodyPr>
           <a:lstStyle/>
           <a:p>
             <a:pPr marL="358775" indent="-274638" algn="just">
+              <a:lnSpc>
+                <a:spcPct val="114000"/>
+              </a:lnSpc>
               <a:buClr>
                 <a:schemeClr val="tx2"/>
               </a:buClr>
@@ -17997,12 +17962,19 @@
               <a:buChar char="•"/>
             </a:pPr>
             <a:r>
-              <a:rPr lang="en-IN" sz="1700" dirty="0"/>
+              <a:rPr lang="en-IN" sz="1700" dirty="0">
+                <a:solidFill>
+                  <a:schemeClr val="tx1"/>
+                </a:solidFill>
+              </a:rPr>
               <a:t>The Data contains 38717 Records and 111 rows which correspond to a Loan Data set, which has loans catered to different purposes.</a:t>
             </a:r>
           </a:p>
           <a:p>
             <a:pPr marL="358775" indent="-274638" algn="just">
+              <a:lnSpc>
+                <a:spcPct val="114000"/>
+              </a:lnSpc>
               <a:buClr>
                 <a:schemeClr val="tx2"/>
               </a:buClr>
@@ -18010,12 +17982,19 @@
               <a:buChar char="•"/>
             </a:pPr>
             <a:r>
-              <a:rPr lang="en-IN" sz="1700" dirty="0"/>
+              <a:rPr lang="en-IN" sz="1700" dirty="0">
+                <a:solidFill>
+                  <a:schemeClr val="tx1"/>
+                </a:solidFill>
+              </a:rPr>
               <a:t>~50% of the data has null values or columns with only 1 value. These columns may not be useful for the analysis.</a:t>
             </a:r>
           </a:p>
           <a:p>
             <a:pPr marL="358775" indent="-274638" algn="just">
+              <a:lnSpc>
+                <a:spcPct val="114000"/>
+              </a:lnSpc>
               <a:buClr>
                 <a:schemeClr val="tx2"/>
               </a:buClr>
@@ -18023,12 +18002,19 @@
               <a:buChar char="•"/>
             </a:pPr>
             <a:r>
-              <a:rPr lang="en-IN" sz="1700" dirty="0"/>
+              <a:rPr lang="en-IN" sz="1700" dirty="0">
+                <a:solidFill>
+                  <a:schemeClr val="tx1"/>
+                </a:solidFill>
+              </a:rPr>
               <a:t>The Data Column ‘loan_status’ attributes the Status of the Loan. The value ‘Charged Off’ means its defaulted. This column is required to filter out the defaulted data and perform analysis.</a:t>
             </a:r>
           </a:p>
           <a:p>
             <a:pPr marL="358775" indent="-274638" algn="just">
+              <a:lnSpc>
+                <a:spcPct val="114000"/>
+              </a:lnSpc>
               <a:buClr>
                 <a:schemeClr val="tx2"/>
               </a:buClr>
@@ -18036,12 +18022,19 @@
               <a:buChar char="•"/>
             </a:pPr>
             <a:r>
-              <a:rPr lang="en-IN" sz="1700" dirty="0"/>
+              <a:rPr lang="en-IN" sz="1700" dirty="0">
+                <a:solidFill>
+                  <a:schemeClr val="tx1"/>
+                </a:solidFill>
+              </a:rPr>
               <a:t>The Data has few demographic information which can be made use of.</a:t>
             </a:r>
           </a:p>
           <a:p>
             <a:pPr marL="358775" indent="-274638" algn="just">
+              <a:lnSpc>
+                <a:spcPct val="114000"/>
+              </a:lnSpc>
               <a:buClr>
                 <a:schemeClr val="tx2"/>
               </a:buClr>
@@ -18049,12 +18042,19 @@
               <a:buChar char="•"/>
             </a:pPr>
             <a:r>
-              <a:rPr lang="en-IN" sz="1700" dirty="0"/>
+              <a:rPr lang="en-IN" sz="1700" dirty="0">
+                <a:solidFill>
+                  <a:schemeClr val="tx1"/>
+                </a:solidFill>
+              </a:rPr>
               <a:t>The data has many columns that correspond to the current on-going loan information (such as outstanding principal amount etc..)</a:t>
             </a:r>
           </a:p>
           <a:p>
             <a:pPr marL="358775" indent="-274638" algn="just">
+              <a:lnSpc>
+                <a:spcPct val="114000"/>
+              </a:lnSpc>
               <a:buClr>
                 <a:schemeClr val="tx2"/>
               </a:buClr>
@@ -18062,7 +18062,11 @@
               <a:buChar char="•"/>
             </a:pPr>
             <a:r>
-              <a:rPr lang="en-IN" sz="1700" dirty="0"/>
+              <a:rPr lang="en-IN" sz="1700" dirty="0">
+                <a:solidFill>
+                  <a:schemeClr val="tx1"/>
+                </a:solidFill>
+              </a:rPr>
               <a:t>The Data has information about some of the codes that are determined by the Grade and Sub-Grade. These can be considered as a Lending Club’s categorization of loans. A specific analysis based on this can give insightful results. </a:t>
             </a:r>
           </a:p>

</xml_diff>